<commit_message>
Added team description in presentation
</commit_message>
<xml_diff>
--- a/docs/SAMHAR COVID-19 Solution - Activity Recognition.pptx
+++ b/docs/SAMHAR COVID-19 Solution - Activity Recognition.pptx
@@ -5,7 +5,7 @@
     <p:sldMasterId id="2147483660" r:id="rId1"/>
   </p:sldMasterIdLst>
   <p:notesMasterIdLst>
-    <p:notesMasterId r:id="rId7"/>
+    <p:notesMasterId r:id="rId8"/>
   </p:notesMasterIdLst>
   <p:sldIdLst>
     <p:sldId id="256" r:id="rId2"/>
@@ -13,6 +13,7 @@
     <p:sldId id="2187" r:id="rId4"/>
     <p:sldId id="2186" r:id="rId5"/>
     <p:sldId id="2184" r:id="rId6"/>
+    <p:sldId id="1026" r:id="rId7"/>
   </p:sldIdLst>
   <p:sldSz cx="12192000" cy="6858000"/>
   <p:notesSz cx="6858000" cy="9144000"/>
@@ -119,6 +120,14 @@
 </p:presentation>
 </file>
 
+<file path=ppt/revisionInfo.xml><?xml version="1.0" encoding="utf-8"?>
+<p1510:revInfo xmlns:a="http://schemas.openxmlformats.org/drawingml/2006/main" xmlns:r="http://schemas.openxmlformats.org/officeDocument/2006/relationships" xmlns:p1510="http://schemas.microsoft.com/office/powerpoint/2015/10/main">
+  <p1510:revLst>
+    <p1510:client id="{8634FAA0-F321-47C4-B938-829705971C98}" v="24" dt="2020-04-20T09:20:52.671"/>
+  </p1510:revLst>
+</p1510:revInfo>
+</file>
+
 <file path=ppt/changesInfos/changesInfo1.xml><?xml version="1.0" encoding="utf-8"?>
 <pc:chgInfo xmlns:a="http://schemas.openxmlformats.org/drawingml/2006/main" xmlns:r="http://schemas.openxmlformats.org/officeDocument/2006/relationships" xmlns:ac="http://schemas.microsoft.com/office/drawing/2013/main/command" xmlns:pc="http://schemas.microsoft.com/office/powerpoint/2013/main/command">
   <pc:docChgLst>
@@ -140,6 +149,290 @@
         <pc:sldMkLst>
           <pc:docMk/>
           <pc:sldMk cId="3917192274" sldId="1027"/>
+        </pc:sldMkLst>
+      </pc:sldChg>
+    </pc:docChg>
+  </pc:docChgLst>
+  <pc:docChgLst>
+    <pc:chgData name="Sharma, Achal" userId="7a8c8a96-1d6e-4064-bdb8-4b85ae52114b" providerId="ADAL" clId="{8634FAA0-F321-47C4-B938-829705971C98}"/>
+    <pc:docChg chg="undo custSel addSld delSld modSld">
+      <pc:chgData name="Sharma, Achal" userId="7a8c8a96-1d6e-4064-bdb8-4b85ae52114b" providerId="ADAL" clId="{8634FAA0-F321-47C4-B938-829705971C98}" dt="2020-04-20T09:20:47.129" v="58" actId="20577"/>
+      <pc:docMkLst>
+        <pc:docMk/>
+      </pc:docMkLst>
+      <pc:sldChg chg="modSp">
+        <pc:chgData name="Sharma, Achal" userId="7a8c8a96-1d6e-4064-bdb8-4b85ae52114b" providerId="ADAL" clId="{8634FAA0-F321-47C4-B938-829705971C98}" dt="2020-04-20T09:17:56.253" v="46" actId="20577"/>
+        <pc:sldMkLst>
+          <pc:docMk/>
+          <pc:sldMk cId="2799414268" sldId="256"/>
+        </pc:sldMkLst>
+        <pc:spChg chg="mod">
+          <ac:chgData name="Sharma, Achal" userId="7a8c8a96-1d6e-4064-bdb8-4b85ae52114b" providerId="ADAL" clId="{8634FAA0-F321-47C4-B938-829705971C98}" dt="2020-04-20T09:17:56.253" v="46" actId="20577"/>
+          <ac:spMkLst>
+            <pc:docMk/>
+            <pc:sldMk cId="2799414268" sldId="256"/>
+            <ac:spMk id="3" creationId="{2949EAC8-434D-4619-891E-819175EC60AD}"/>
+          </ac:spMkLst>
+        </pc:spChg>
+      </pc:sldChg>
+      <pc:sldChg chg="addSp delSp modSp add">
+        <pc:chgData name="Sharma, Achal" userId="7a8c8a96-1d6e-4064-bdb8-4b85ae52114b" providerId="ADAL" clId="{8634FAA0-F321-47C4-B938-829705971C98}" dt="2020-04-20T09:17:36.052" v="41" actId="164"/>
+        <pc:sldMkLst>
+          <pc:docMk/>
+          <pc:sldMk cId="2511045304" sldId="1026"/>
+        </pc:sldMkLst>
+        <pc:spChg chg="add mod">
+          <ac:chgData name="Sharma, Achal" userId="7a8c8a96-1d6e-4064-bdb8-4b85ae52114b" providerId="ADAL" clId="{8634FAA0-F321-47C4-B938-829705971C98}" dt="2020-04-20T09:14:45.560" v="5" actId="164"/>
+          <ac:spMkLst>
+            <pc:docMk/>
+            <pc:sldMk cId="2511045304" sldId="1026"/>
+            <ac:spMk id="18" creationId="{EFC6C753-BC76-4716-82BC-D0155DA2DC65}"/>
+          </ac:spMkLst>
+        </pc:spChg>
+        <pc:spChg chg="add mod">
+          <ac:chgData name="Sharma, Achal" userId="7a8c8a96-1d6e-4064-bdb8-4b85ae52114b" providerId="ADAL" clId="{8634FAA0-F321-47C4-B938-829705971C98}" dt="2020-04-20T09:14:45.560" v="5" actId="164"/>
+          <ac:spMkLst>
+            <pc:docMk/>
+            <pc:sldMk cId="2511045304" sldId="1026"/>
+            <ac:spMk id="19" creationId="{83FB3416-5781-4278-B991-0DEA02F1591F}"/>
+          </ac:spMkLst>
+        </pc:spChg>
+        <pc:spChg chg="mod">
+          <ac:chgData name="Sharma, Achal" userId="7a8c8a96-1d6e-4064-bdb8-4b85ae52114b" providerId="ADAL" clId="{8634FAA0-F321-47C4-B938-829705971C98}" dt="2020-04-20T09:14:50.212" v="6" actId="164"/>
+          <ac:spMkLst>
+            <pc:docMk/>
+            <pc:sldMk cId="2511045304" sldId="1026"/>
+            <ac:spMk id="20" creationId="{1B4DEA2D-306E-4B05-9E49-1AB36029DB1D}"/>
+          </ac:spMkLst>
+        </pc:spChg>
+        <pc:spChg chg="del">
+          <ac:chgData name="Sharma, Achal" userId="7a8c8a96-1d6e-4064-bdb8-4b85ae52114b" providerId="ADAL" clId="{8634FAA0-F321-47C4-B938-829705971C98}" dt="2020-04-20T09:14:33.428" v="1" actId="478"/>
+          <ac:spMkLst>
+            <pc:docMk/>
+            <pc:sldMk cId="2511045304" sldId="1026"/>
+            <ac:spMk id="21" creationId="{D5214F1C-A63D-493C-939D-502015B1A522}"/>
+          </ac:spMkLst>
+        </pc:spChg>
+        <pc:spChg chg="del">
+          <ac:chgData name="Sharma, Achal" userId="7a8c8a96-1d6e-4064-bdb8-4b85ae52114b" providerId="ADAL" clId="{8634FAA0-F321-47C4-B938-829705971C98}" dt="2020-04-20T09:14:33.428" v="1" actId="478"/>
+          <ac:spMkLst>
+            <pc:docMk/>
+            <pc:sldMk cId="2511045304" sldId="1026"/>
+            <ac:spMk id="22" creationId="{83B97522-D51E-488F-93D4-BB8D3DFCE1F4}"/>
+          </ac:spMkLst>
+        </pc:spChg>
+        <pc:spChg chg="mod">
+          <ac:chgData name="Sharma, Achal" userId="7a8c8a96-1d6e-4064-bdb8-4b85ae52114b" providerId="ADAL" clId="{8634FAA0-F321-47C4-B938-829705971C98}" dt="2020-04-20T09:17:04.757" v="34" actId="164"/>
+          <ac:spMkLst>
+            <pc:docMk/>
+            <pc:sldMk cId="2511045304" sldId="1026"/>
+            <ac:spMk id="23" creationId="{A8188105-DE9D-4ECD-A1AE-16D9B1FD420D}"/>
+          </ac:spMkLst>
+        </pc:spChg>
+        <pc:spChg chg="mod">
+          <ac:chgData name="Sharma, Achal" userId="7a8c8a96-1d6e-4064-bdb8-4b85ae52114b" providerId="ADAL" clId="{8634FAA0-F321-47C4-B938-829705971C98}" dt="2020-04-20T09:17:04.757" v="34" actId="164"/>
+          <ac:spMkLst>
+            <pc:docMk/>
+            <pc:sldMk cId="2511045304" sldId="1026"/>
+            <ac:spMk id="24" creationId="{79BBD5AD-D136-45F7-9C1D-F1B249CD7CCA}"/>
+          </ac:spMkLst>
+        </pc:spChg>
+        <pc:spChg chg="mod">
+          <ac:chgData name="Sharma, Achal" userId="7a8c8a96-1d6e-4064-bdb8-4b85ae52114b" providerId="ADAL" clId="{8634FAA0-F321-47C4-B938-829705971C98}" dt="2020-04-20T09:14:50.212" v="6" actId="164"/>
+          <ac:spMkLst>
+            <pc:docMk/>
+            <pc:sldMk cId="2511045304" sldId="1026"/>
+            <ac:spMk id="25" creationId="{C3461454-A2CF-4E0B-B87E-F071F89E084D}"/>
+          </ac:spMkLst>
+        </pc:spChg>
+        <pc:spChg chg="del">
+          <ac:chgData name="Sharma, Achal" userId="7a8c8a96-1d6e-4064-bdb8-4b85ae52114b" providerId="ADAL" clId="{8634FAA0-F321-47C4-B938-829705971C98}" dt="2020-04-20T09:14:36.160" v="2" actId="478"/>
+          <ac:spMkLst>
+            <pc:docMk/>
+            <pc:sldMk cId="2511045304" sldId="1026"/>
+            <ac:spMk id="29" creationId="{A57763AC-A636-4937-974E-6A36075CB930}"/>
+          </ac:spMkLst>
+        </pc:spChg>
+        <pc:spChg chg="del">
+          <ac:chgData name="Sharma, Achal" userId="7a8c8a96-1d6e-4064-bdb8-4b85ae52114b" providerId="ADAL" clId="{8634FAA0-F321-47C4-B938-829705971C98}" dt="2020-04-20T09:14:36.160" v="2" actId="478"/>
+          <ac:spMkLst>
+            <pc:docMk/>
+            <pc:sldMk cId="2511045304" sldId="1026"/>
+            <ac:spMk id="30" creationId="{60ECBECD-5E87-4928-BFAC-61E8C52D2578}"/>
+          </ac:spMkLst>
+        </pc:spChg>
+        <pc:spChg chg="mod">
+          <ac:chgData name="Sharma, Achal" userId="7a8c8a96-1d6e-4064-bdb8-4b85ae52114b" providerId="ADAL" clId="{8634FAA0-F321-47C4-B938-829705971C98}" dt="2020-04-20T09:17:04.757" v="34" actId="164"/>
+          <ac:spMkLst>
+            <pc:docMk/>
+            <pc:sldMk cId="2511045304" sldId="1026"/>
+            <ac:spMk id="32" creationId="{83E96A3D-49EA-430C-8D79-18216568B44D}"/>
+          </ac:spMkLst>
+        </pc:spChg>
+        <pc:spChg chg="del">
+          <ac:chgData name="Sharma, Achal" userId="7a8c8a96-1d6e-4064-bdb8-4b85ae52114b" providerId="ADAL" clId="{8634FAA0-F321-47C4-B938-829705971C98}" dt="2020-04-20T09:14:33.428" v="1" actId="478"/>
+          <ac:spMkLst>
+            <pc:docMk/>
+            <pc:sldMk cId="2511045304" sldId="1026"/>
+            <ac:spMk id="33" creationId="{843F8822-5575-4402-8795-A5F2F1E4EC87}"/>
+          </ac:spMkLst>
+        </pc:spChg>
+        <pc:spChg chg="mod">
+          <ac:chgData name="Sharma, Achal" userId="7a8c8a96-1d6e-4064-bdb8-4b85ae52114b" providerId="ADAL" clId="{8634FAA0-F321-47C4-B938-829705971C98}" dt="2020-04-20T09:17:36.052" v="41" actId="164"/>
+          <ac:spMkLst>
+            <pc:docMk/>
+            <pc:sldMk cId="2511045304" sldId="1026"/>
+            <ac:spMk id="34" creationId="{E0E1F504-6E68-4357-973B-21F330E679A5}"/>
+          </ac:spMkLst>
+        </pc:spChg>
+        <pc:spChg chg="del">
+          <ac:chgData name="Sharma, Achal" userId="7a8c8a96-1d6e-4064-bdb8-4b85ae52114b" providerId="ADAL" clId="{8634FAA0-F321-47C4-B938-829705971C98}" dt="2020-04-20T09:14:36.160" v="2" actId="478"/>
+          <ac:spMkLst>
+            <pc:docMk/>
+            <pc:sldMk cId="2511045304" sldId="1026"/>
+            <ac:spMk id="35" creationId="{B9ACEC03-6BC4-41BE-88D5-F1CFB81C33A9}"/>
+          </ac:spMkLst>
+        </pc:spChg>
+        <pc:spChg chg="add mod">
+          <ac:chgData name="Sharma, Achal" userId="7a8c8a96-1d6e-4064-bdb8-4b85ae52114b" providerId="ADAL" clId="{8634FAA0-F321-47C4-B938-829705971C98}" dt="2020-04-20T09:14:45.560" v="5" actId="164"/>
+          <ac:spMkLst>
+            <pc:docMk/>
+            <pc:sldMk cId="2511045304" sldId="1026"/>
+            <ac:spMk id="36" creationId="{F7D02255-0BCE-43DC-BC45-1D9E4AEBF1D5}"/>
+          </ac:spMkLst>
+        </pc:spChg>
+        <pc:grpChg chg="add mod">
+          <ac:chgData name="Sharma, Achal" userId="7a8c8a96-1d6e-4064-bdb8-4b85ae52114b" providerId="ADAL" clId="{8634FAA0-F321-47C4-B938-829705971C98}" dt="2020-04-20T09:17:25.369" v="39" actId="408"/>
+          <ac:grpSpMkLst>
+            <pc:docMk/>
+            <pc:sldMk cId="2511045304" sldId="1026"/>
+            <ac:grpSpMk id="3" creationId="{BD53C3DF-B183-4541-8608-F7F8D17DC193}"/>
+          </ac:grpSpMkLst>
+        </pc:grpChg>
+        <pc:grpChg chg="add mod">
+          <ac:chgData name="Sharma, Achal" userId="7a8c8a96-1d6e-4064-bdb8-4b85ae52114b" providerId="ADAL" clId="{8634FAA0-F321-47C4-B938-829705971C98}" dt="2020-04-20T09:17:36.052" v="41" actId="164"/>
+          <ac:grpSpMkLst>
+            <pc:docMk/>
+            <pc:sldMk cId="2511045304" sldId="1026"/>
+            <ac:grpSpMk id="4" creationId="{4A2D1062-0BC0-4E71-82C9-30BE02C1F88F}"/>
+          </ac:grpSpMkLst>
+        </pc:grpChg>
+        <pc:grpChg chg="add mod">
+          <ac:chgData name="Sharma, Achal" userId="7a8c8a96-1d6e-4064-bdb8-4b85ae52114b" providerId="ADAL" clId="{8634FAA0-F321-47C4-B938-829705971C98}" dt="2020-04-20T09:17:25.369" v="39" actId="408"/>
+          <ac:grpSpMkLst>
+            <pc:docMk/>
+            <pc:sldMk cId="2511045304" sldId="1026"/>
+            <ac:grpSpMk id="6" creationId="{BB32AC8A-7233-492C-BC9A-A0AF7D96A2E1}"/>
+          </ac:grpSpMkLst>
+        </pc:grpChg>
+        <pc:grpChg chg="add mod">
+          <ac:chgData name="Sharma, Achal" userId="7a8c8a96-1d6e-4064-bdb8-4b85ae52114b" providerId="ADAL" clId="{8634FAA0-F321-47C4-B938-829705971C98}" dt="2020-04-20T09:17:36.052" v="41" actId="164"/>
+          <ac:grpSpMkLst>
+            <pc:docMk/>
+            <pc:sldMk cId="2511045304" sldId="1026"/>
+            <ac:grpSpMk id="7" creationId="{48652044-50B3-4759-91CA-4BF4DFB7F3B7}"/>
+          </ac:grpSpMkLst>
+        </pc:grpChg>
+        <pc:picChg chg="add del mod">
+          <ac:chgData name="Sharma, Achal" userId="7a8c8a96-1d6e-4064-bdb8-4b85ae52114b" providerId="ADAL" clId="{8634FAA0-F321-47C4-B938-829705971C98}" dt="2020-04-20T09:16:23.294" v="25" actId="478"/>
+          <ac:picMkLst>
+            <pc:docMk/>
+            <pc:sldMk cId="2511045304" sldId="1026"/>
+            <ac:picMk id="5" creationId="{E53A0428-F759-424F-AD4D-40B8BB6CA133}"/>
+          </ac:picMkLst>
+        </pc:picChg>
+        <pc:picChg chg="mod">
+          <ac:chgData name="Sharma, Achal" userId="7a8c8a96-1d6e-4064-bdb8-4b85ae52114b" providerId="ADAL" clId="{8634FAA0-F321-47C4-B938-829705971C98}" dt="2020-04-20T09:17:04.757" v="34" actId="164"/>
+          <ac:picMkLst>
+            <pc:docMk/>
+            <pc:sldMk cId="2511045304" sldId="1026"/>
+            <ac:picMk id="26" creationId="{8BAF6A94-A5F2-40FA-9345-52655EC292FE}"/>
+          </ac:picMkLst>
+        </pc:picChg>
+        <pc:picChg chg="mod">
+          <ac:chgData name="Sharma, Achal" userId="7a8c8a96-1d6e-4064-bdb8-4b85ae52114b" providerId="ADAL" clId="{8634FAA0-F321-47C4-B938-829705971C98}" dt="2020-04-20T09:14:50.212" v="6" actId="164"/>
+          <ac:picMkLst>
+            <pc:docMk/>
+            <pc:sldMk cId="2511045304" sldId="1026"/>
+            <ac:picMk id="27" creationId="{2748FEBD-CB7A-4D65-AA30-D1A01B95B7E3}"/>
+          </ac:picMkLst>
+        </pc:picChg>
+        <pc:picChg chg="add mod">
+          <ac:chgData name="Sharma, Achal" userId="7a8c8a96-1d6e-4064-bdb8-4b85ae52114b" providerId="ADAL" clId="{8634FAA0-F321-47C4-B938-829705971C98}" dt="2020-04-20T09:14:45.560" v="5" actId="164"/>
+          <ac:picMkLst>
+            <pc:docMk/>
+            <pc:sldMk cId="2511045304" sldId="1026"/>
+            <ac:picMk id="28" creationId="{C7D150B2-1EE1-49E8-9A50-AC47824B3BED}"/>
+          </ac:picMkLst>
+        </pc:picChg>
+        <pc:picChg chg="del">
+          <ac:chgData name="Sharma, Achal" userId="7a8c8a96-1d6e-4064-bdb8-4b85ae52114b" providerId="ADAL" clId="{8634FAA0-F321-47C4-B938-829705971C98}" dt="2020-04-20T09:14:36.160" v="2" actId="478"/>
+          <ac:picMkLst>
+            <pc:docMk/>
+            <pc:sldMk cId="2511045304" sldId="1026"/>
+            <ac:picMk id="31" creationId="{D854352E-8556-4700-9DC8-CD3114E4B923}"/>
+          </ac:picMkLst>
+        </pc:picChg>
+      </pc:sldChg>
+      <pc:sldChg chg="delSp add del">
+        <pc:chgData name="Sharma, Achal" userId="7a8c8a96-1d6e-4064-bdb8-4b85ae52114b" providerId="ADAL" clId="{8634FAA0-F321-47C4-B938-829705971C98}" dt="2020-04-20T09:17:42.065" v="42" actId="2696"/>
+        <pc:sldMkLst>
+          <pc:docMk/>
+          <pc:sldMk cId="3917192274" sldId="1027"/>
+        </pc:sldMkLst>
+        <pc:spChg chg="del">
+          <ac:chgData name="Sharma, Achal" userId="7a8c8a96-1d6e-4064-bdb8-4b85ae52114b" providerId="ADAL" clId="{8634FAA0-F321-47C4-B938-829705971C98}" dt="2020-04-20T09:14:41.742" v="3"/>
+          <ac:spMkLst>
+            <pc:docMk/>
+            <pc:sldMk cId="3917192274" sldId="1027"/>
+            <ac:spMk id="15" creationId="{F87CF7E8-6917-4AB0-954E-577E09D1FE93}"/>
+          </ac:spMkLst>
+        </pc:spChg>
+        <pc:spChg chg="del">
+          <ac:chgData name="Sharma, Achal" userId="7a8c8a96-1d6e-4064-bdb8-4b85ae52114b" providerId="ADAL" clId="{8634FAA0-F321-47C4-B938-829705971C98}" dt="2020-04-20T09:14:41.742" v="3"/>
+          <ac:spMkLst>
+            <pc:docMk/>
+            <pc:sldMk cId="3917192274" sldId="1027"/>
+            <ac:spMk id="23" creationId="{D7050F3C-E093-460F-9BF7-C48CE4DB415F}"/>
+          </ac:spMkLst>
+        </pc:spChg>
+        <pc:spChg chg="del">
+          <ac:chgData name="Sharma, Achal" userId="7a8c8a96-1d6e-4064-bdb8-4b85ae52114b" providerId="ADAL" clId="{8634FAA0-F321-47C4-B938-829705971C98}" dt="2020-04-20T09:14:41.742" v="3"/>
+          <ac:spMkLst>
+            <pc:docMk/>
+            <pc:sldMk cId="3917192274" sldId="1027"/>
+            <ac:spMk id="36" creationId="{374A5207-B22E-43D7-8537-4F60E784EFFF}"/>
+          </ac:spMkLst>
+        </pc:spChg>
+        <pc:picChg chg="del">
+          <ac:chgData name="Sharma, Achal" userId="7a8c8a96-1d6e-4064-bdb8-4b85ae52114b" providerId="ADAL" clId="{8634FAA0-F321-47C4-B938-829705971C98}" dt="2020-04-20T09:14:41.742" v="3"/>
+          <ac:picMkLst>
+            <pc:docMk/>
+            <pc:sldMk cId="3917192274" sldId="1027"/>
+            <ac:picMk id="29" creationId="{927372F9-8A1E-4B39-AF4B-74E651F1D320}"/>
+          </ac:picMkLst>
+        </pc:picChg>
+      </pc:sldChg>
+      <pc:sldChg chg="modSp">
+        <pc:chgData name="Sharma, Achal" userId="7a8c8a96-1d6e-4064-bdb8-4b85ae52114b" providerId="ADAL" clId="{8634FAA0-F321-47C4-B938-829705971C98}" dt="2020-04-20T09:20:47.129" v="58" actId="20577"/>
+        <pc:sldMkLst>
+          <pc:docMk/>
+          <pc:sldMk cId="3620791312" sldId="2183"/>
+        </pc:sldMkLst>
+        <pc:spChg chg="mod">
+          <ac:chgData name="Sharma, Achal" userId="7a8c8a96-1d6e-4064-bdb8-4b85ae52114b" providerId="ADAL" clId="{8634FAA0-F321-47C4-B938-829705971C98}" dt="2020-04-20T09:20:47.129" v="58" actId="20577"/>
+          <ac:spMkLst>
+            <pc:docMk/>
+            <pc:sldMk cId="3620791312" sldId="2183"/>
+            <ac:spMk id="3" creationId="{3611B8E3-A7E0-445E-9961-0AE14C66794B}"/>
+          </ac:spMkLst>
+        </pc:spChg>
+      </pc:sldChg>
+      <pc:sldChg chg="add del">
+        <pc:chgData name="Sharma, Achal" userId="7a8c8a96-1d6e-4064-bdb8-4b85ae52114b" providerId="ADAL" clId="{8634FAA0-F321-47C4-B938-829705971C98}" dt="2020-04-20T09:17:47.465" v="44" actId="2696"/>
+        <pc:sldMkLst>
+          <pc:docMk/>
+          <pc:sldMk cId="3790674691" sldId="2188"/>
         </pc:sldMkLst>
       </pc:sldChg>
     </pc:docChg>
@@ -2986,7 +3279,7 @@
           <a:p>
             <a:fld id="{E99D717D-C6B6-47A3-9723-1818B8E12CFF}" type="datetimeFigureOut">
               <a:rPr lang="en-US" smtClean="0"/>
-              <a:t>4/17/2020</a:t>
+              <a:t>4/20/2020</a:t>
             </a:fld>
             <a:endParaRPr lang="en-US"/>
           </a:p>
@@ -4749,7 +5042,7 @@
           <a:p>
             <a:fld id="{616743CD-69CB-4BA8-BEE4-D2135F9F1890}" type="datetimeFigureOut">
               <a:rPr lang="en-US" smtClean="0"/>
-              <a:t>4/17/2020</a:t>
+              <a:t>4/20/2020</a:t>
             </a:fld>
             <a:endParaRPr lang="en-US"/>
           </a:p>
@@ -5473,28 +5766,10 @@
           </a:p>
           <a:p>
             <a:r>
-              <a:rPr lang="en-US" sz="2000" dirty="0"/>
+              <a:rPr lang="en-US" sz="2000"/>
               <a:t>Anuj Gupta</a:t>
             </a:r>
-          </a:p>
-          <a:p>
-            <a:r>
-              <a:rPr lang="en-US" sz="2000" dirty="0" err="1"/>
-              <a:t>Shantam</a:t>
-            </a:r>
-            <a:r>
-              <a:rPr lang="en-US" sz="2000" dirty="0"/>
-              <a:t> Sharma</a:t>
-            </a:r>
-          </a:p>
-          <a:p>
-            <a:r>
-              <a:rPr lang="en-US" sz="2000" dirty="0"/>
-              <a:t>&lt;intern&gt;</a:t>
-            </a:r>
-          </a:p>
-          <a:p>
-            <a:endParaRPr lang="en-US" dirty="0"/>
+            <a:endParaRPr lang="en-US" sz="2000" dirty="0"/>
           </a:p>
         </p:txBody>
       </p:sp>
@@ -5699,9 +5974,12 @@
           </a:p>
           <a:p>
             <a:r>
-              <a:rPr lang="en-US" dirty="0"/>
-              <a:t>Git Repository - </a:t>
+              <a:rPr lang="en-US" dirty="0">
+                <a:hlinkClick r:id="rId2"/>
+              </a:rPr>
+              <a:t>Git Repository</a:t>
             </a:r>
+            <a:endParaRPr lang="en-US" dirty="0"/>
           </a:p>
           <a:p>
             <a:pPr marL="285750" indent="-285750">
@@ -8003,6 +8281,967 @@
     <p:extLst>
       <p:ext uri="{BB962C8B-B14F-4D97-AF65-F5344CB8AC3E}">
         <p14:creationId xmlns:p14="http://schemas.microsoft.com/office/powerpoint/2010/main" val="4171662720"/>
+      </p:ext>
+    </p:extLst>
+  </p:cSld>
+  <p:clrMapOvr>
+    <a:masterClrMapping/>
+  </p:clrMapOvr>
+</p:sld>
+</file>
+
+<file path=ppt/slides/slide6.xml><?xml version="1.0" encoding="utf-8"?>
+<p:sld xmlns:a="http://schemas.openxmlformats.org/drawingml/2006/main" xmlns:r="http://schemas.openxmlformats.org/officeDocument/2006/relationships" xmlns:p="http://schemas.openxmlformats.org/presentationml/2006/main">
+  <p:cSld>
+    <p:spTree>
+      <p:nvGrpSpPr>
+        <p:cNvPr id="1" name=""/>
+        <p:cNvGrpSpPr/>
+        <p:nvPr/>
+      </p:nvGrpSpPr>
+      <p:grpSpPr>
+        <a:xfrm>
+          <a:off x="0" y="0"/>
+          <a:ext cx="0" cy="0"/>
+          <a:chOff x="0" y="0"/>
+          <a:chExt cx="0" cy="0"/>
+        </a:xfrm>
+      </p:grpSpPr>
+      <p:sp>
+        <p:nvSpPr>
+          <p:cNvPr id="2" name="Title 1">
+            <a:extLst>
+              <a:ext uri="{FF2B5EF4-FFF2-40B4-BE49-F238E27FC236}">
+                <a16:creationId xmlns:a16="http://schemas.microsoft.com/office/drawing/2014/main" id="{AD7278B5-026F-479B-A849-F8CA1ED85069}"/>
+              </a:ext>
+            </a:extLst>
+          </p:cNvPr>
+          <p:cNvSpPr>
+            <a:spLocks noGrp="1"/>
+          </p:cNvSpPr>
+          <p:nvPr>
+            <p:ph type="title"/>
+          </p:nvPr>
+        </p:nvSpPr>
+        <p:spPr/>
+        <p:txBody>
+          <a:bodyPr/>
+          <a:lstStyle/>
+          <a:p>
+            <a:r>
+              <a:rPr lang="en-US" dirty="0"/>
+              <a:t>Team Profile</a:t>
+            </a:r>
+          </a:p>
+        </p:txBody>
+      </p:sp>
+      <p:grpSp>
+        <p:nvGrpSpPr>
+          <p:cNvPr id="6" name="Group 5">
+            <a:extLst>
+              <a:ext uri="{FF2B5EF4-FFF2-40B4-BE49-F238E27FC236}">
+                <a16:creationId xmlns:a16="http://schemas.microsoft.com/office/drawing/2014/main" id="{BB32AC8A-7233-492C-BC9A-A0AF7D96A2E1}"/>
+              </a:ext>
+            </a:extLst>
+          </p:cNvPr>
+          <p:cNvGrpSpPr/>
+          <p:nvPr/>
+        </p:nvGrpSpPr>
+        <p:grpSpPr>
+          <a:xfrm>
+            <a:off x="1514628" y="1732737"/>
+            <a:ext cx="2198956" cy="3412869"/>
+            <a:chOff x="1514628" y="1732737"/>
+            <a:chExt cx="2198956" cy="3412869"/>
+          </a:xfrm>
+        </p:grpSpPr>
+        <p:sp>
+          <p:nvSpPr>
+            <p:cNvPr id="23" name="Rounded Rectangle 133">
+              <a:extLst>
+                <a:ext uri="{FF2B5EF4-FFF2-40B4-BE49-F238E27FC236}">
+                  <a16:creationId xmlns:a16="http://schemas.microsoft.com/office/drawing/2014/main" id="{A8188105-DE9D-4ECD-A1AE-16D9B1FD420D}"/>
+                </a:ext>
+              </a:extLst>
+            </p:cNvPr>
+            <p:cNvSpPr/>
+            <p:nvPr/>
+          </p:nvSpPr>
+          <p:spPr>
+            <a:xfrm>
+              <a:off x="1514628" y="1732737"/>
+              <a:ext cx="2066905" cy="3412869"/>
+            </a:xfrm>
+            <a:prstGeom prst="roundRect">
+              <a:avLst>
+                <a:gd name="adj" fmla="val 7949"/>
+              </a:avLst>
+            </a:prstGeom>
+            <a:solidFill>
+              <a:schemeClr val="bg1">
+                <a:lumMod val="95000"/>
+              </a:schemeClr>
+            </a:solidFill>
+            <a:ln w="3175" cmpd="sng"/>
+          </p:spPr>
+          <p:style>
+            <a:lnRef idx="1">
+              <a:schemeClr val="accent1"/>
+            </a:lnRef>
+            <a:fillRef idx="3">
+              <a:schemeClr val="accent1"/>
+            </a:fillRef>
+            <a:effectRef idx="2">
+              <a:schemeClr val="accent1"/>
+            </a:effectRef>
+            <a:fontRef idx="minor">
+              <a:schemeClr val="lt1"/>
+            </a:fontRef>
+          </p:style>
+          <p:txBody>
+            <a:bodyPr lIns="60942" tIns="804462" rIns="0" bIns="0" rtlCol="0" anchor="t"/>
+            <a:lstStyle/>
+            <a:p>
+              <a:endParaRPr lang="en-US" sz="1300" dirty="0">
+                <a:solidFill>
+                  <a:srgbClr val="000000"/>
+                </a:solidFill>
+              </a:endParaRPr>
+            </a:p>
+            <a:p>
+              <a:r>
+                <a:rPr lang="en-US" sz="1200" dirty="0">
+                  <a:solidFill>
+                    <a:srgbClr val="000000"/>
+                  </a:solidFill>
+                  <a:latin typeface="Arial"/>
+                  <a:cs typeface="Arial"/>
+                </a:rPr>
+                <a:t>10 years of experience into Big Data, Analytics and the Software industry. Expertise in Internet of Things and building predictive models based on sensor data. Prior experience with Samsung, AXA, </a:t>
+              </a:r>
+              <a:r>
+                <a:rPr lang="en-US" sz="1200" dirty="0" err="1">
+                  <a:solidFill>
+                    <a:srgbClr val="000000"/>
+                  </a:solidFill>
+                  <a:latin typeface="Arial"/>
+                  <a:cs typeface="Arial"/>
+                </a:rPr>
+                <a:t>Absolutdata</a:t>
+              </a:r>
+              <a:r>
+                <a:rPr lang="en-US" sz="1200" dirty="0">
+                  <a:solidFill>
+                    <a:srgbClr val="000000"/>
+                  </a:solidFill>
+                  <a:latin typeface="Arial"/>
+                  <a:cs typeface="Arial"/>
+                </a:rPr>
+                <a:t> Technologies.</a:t>
+              </a:r>
+              <a:endParaRPr lang="en-US" sz="1300" dirty="0">
+                <a:solidFill>
+                  <a:srgbClr val="000000"/>
+                </a:solidFill>
+              </a:endParaRPr>
+            </a:p>
+            <a:p>
+              <a:pPr>
+                <a:spcBef>
+                  <a:spcPts val="267"/>
+                </a:spcBef>
+              </a:pPr>
+              <a:endParaRPr lang="en-US" sz="1300" dirty="0">
+                <a:solidFill>
+                  <a:prstClr val="black"/>
+                </a:solidFill>
+                <a:latin typeface="Calibri"/>
+              </a:endParaRPr>
+            </a:p>
+          </p:txBody>
+        </p:sp>
+        <p:sp>
+          <p:nvSpPr>
+            <p:cNvPr id="24" name="Text Box 4">
+              <a:extLst>
+                <a:ext uri="{FF2B5EF4-FFF2-40B4-BE49-F238E27FC236}">
+                  <a16:creationId xmlns:a16="http://schemas.microsoft.com/office/drawing/2014/main" id="{79BBD5AD-D136-45F7-9C1D-F1B249CD7CCA}"/>
+                </a:ext>
+              </a:extLst>
+            </p:cNvPr>
+            <p:cNvSpPr txBox="1">
+              <a:spLocks noChangeArrowheads="1"/>
+            </p:cNvSpPr>
+            <p:nvPr/>
+          </p:nvSpPr>
+          <p:spPr bwMode="auto">
+            <a:xfrm>
+              <a:off x="1522162" y="1732737"/>
+              <a:ext cx="2059370" cy="914162"/>
+            </a:xfrm>
+            <a:prstGeom prst="rect">
+              <a:avLst/>
+            </a:prstGeom>
+            <a:noFill/>
+            <a:ln>
+              <a:noFill/>
+            </a:ln>
+            <a:extLst>
+              <a:ext uri="{909E8E84-426E-40dd-AFC4-6F175D3DCCD1}">
+                <a14:hiddenFill xmlns:a14="http://schemas.microsoft.com/office/drawing/2010/main" xmlns="">
+                  <a:solidFill>
+                    <a:srgbClr val="FFFFFF"/>
+                  </a:solidFill>
+                </a14:hiddenFill>
+              </a:ext>
+              <a:ext uri="{91240B29-F687-4f45-9708-019B960494DF}">
+                <a14:hiddenLine xmlns:a14="http://schemas.microsoft.com/office/drawing/2010/main" xmlns="" w="9525">
+                  <a:solidFill>
+                    <a:srgbClr val="000000"/>
+                  </a:solidFill>
+                  <a:miter lim="800000"/>
+                  <a:headEnd type="none" w="med" len="med"/>
+                  <a:tailEnd type="none" w="med" len="med"/>
+                </a14:hiddenLine>
+              </a:ext>
+            </a:extLst>
+          </p:spPr>
+          <p:txBody>
+            <a:bodyPr rot="0" vert="horz" wrap="square" lIns="853197" tIns="121885" rIns="0" bIns="0" anchor="t" anchorCtr="0" upright="1">
+              <a:noAutofit/>
+            </a:bodyPr>
+            <a:lstStyle/>
+            <a:p>
+              <a:pPr>
+                <a:lnSpc>
+                  <a:spcPct val="115000"/>
+                </a:lnSpc>
+              </a:pPr>
+              <a:r>
+                <a:rPr lang="en-US" sz="1600" b="1" dirty="0">
+                  <a:solidFill>
+                    <a:srgbClr val="0091D0"/>
+                  </a:solidFill>
+                  <a:latin typeface="Calibri"/>
+                  <a:ea typeface="Cambria"/>
+                  <a:cs typeface="Times New Roman"/>
+                </a:rPr>
+                <a:t>Ankur Gupta</a:t>
+              </a:r>
+              <a:endParaRPr lang="en-US" sz="1600" dirty="0">
+                <a:solidFill>
+                  <a:prstClr val="black"/>
+                </a:solidFill>
+                <a:latin typeface="Cambria"/>
+                <a:ea typeface="Cambria"/>
+                <a:cs typeface="Times New Roman"/>
+              </a:endParaRPr>
+            </a:p>
+          </p:txBody>
+        </p:sp>
+        <p:pic>
+          <p:nvPicPr>
+            <p:cNvPr id="26" name="Picture 16">
+              <a:extLst>
+                <a:ext uri="{FF2B5EF4-FFF2-40B4-BE49-F238E27FC236}">
+                  <a16:creationId xmlns:a16="http://schemas.microsoft.com/office/drawing/2014/main" id="{8BAF6A94-A5F2-40FA-9345-52655EC292FE}"/>
+                </a:ext>
+              </a:extLst>
+            </p:cNvPr>
+            <p:cNvPicPr>
+              <a:picLocks noChangeArrowheads="1"/>
+            </p:cNvPicPr>
+            <p:nvPr/>
+          </p:nvPicPr>
+          <p:blipFill rotWithShape="1">
+            <a:blip r:embed="rId2">
+              <a:extLst>
+                <a:ext uri="{28A0092B-C50C-407E-A947-70E740481C1C}">
+                  <a14:useLocalDpi xmlns:a14="http://schemas.microsoft.com/office/drawing/2010/main" val="0"/>
+                </a:ext>
+              </a:extLst>
+            </a:blip>
+            <a:srcRect/>
+            <a:stretch/>
+          </p:blipFill>
+          <p:spPr bwMode="auto">
+            <a:xfrm>
+              <a:off x="1594173" y="1813841"/>
+              <a:ext cx="681826" cy="728165"/>
+            </a:xfrm>
+            <a:prstGeom prst="ellipse">
+              <a:avLst/>
+            </a:prstGeom>
+            <a:ln w="28575" cap="rnd">
+              <a:solidFill>
+                <a:schemeClr val="tx2">
+                  <a:lumMod val="60000"/>
+                  <a:lumOff val="40000"/>
+                </a:schemeClr>
+              </a:solidFill>
+            </a:ln>
+            <a:effectLst/>
+            <a:extLst>
+              <a:ext uri="{909E8E84-426E-40dd-AFC4-6F175D3DCCD1}">
+                <a14:hiddenFill xmlns="" xmlns:a14="http://schemas.microsoft.com/office/drawing/2010/main">
+                  <a:solidFill>
+                    <a:srgbClr val="FFFFFF"/>
+                  </a:solidFill>
+                </a14:hiddenFill>
+              </a:ext>
+            </a:extLst>
+          </p:spPr>
+        </p:pic>
+        <p:sp>
+          <p:nvSpPr>
+            <p:cNvPr id="32" name="TextBox 31">
+              <a:extLst>
+                <a:ext uri="{FF2B5EF4-FFF2-40B4-BE49-F238E27FC236}">
+                  <a16:creationId xmlns:a16="http://schemas.microsoft.com/office/drawing/2014/main" id="{83E96A3D-49EA-430C-8D79-18216568B44D}"/>
+                </a:ext>
+              </a:extLst>
+            </p:cNvPr>
+            <p:cNvSpPr txBox="1"/>
+            <p:nvPr/>
+          </p:nvSpPr>
+          <p:spPr>
+            <a:xfrm>
+              <a:off x="1522162" y="4668636"/>
+              <a:ext cx="2191422" cy="276999"/>
+            </a:xfrm>
+            <a:prstGeom prst="rect">
+              <a:avLst/>
+            </a:prstGeom>
+            <a:noFill/>
+          </p:spPr>
+          <p:txBody>
+            <a:bodyPr wrap="square" rtlCol="0">
+              <a:spAutoFit/>
+            </a:bodyPr>
+            <a:lstStyle/>
+            <a:p>
+              <a:r>
+                <a:rPr lang="en-US" sz="1200" dirty="0"/>
+                <a:t>B.Tech. Computer Science</a:t>
+              </a:r>
+            </a:p>
+          </p:txBody>
+        </p:sp>
+      </p:grpSp>
+      <p:grpSp>
+        <p:nvGrpSpPr>
+          <p:cNvPr id="7" name="Group 6">
+            <a:extLst>
+              <a:ext uri="{FF2B5EF4-FFF2-40B4-BE49-F238E27FC236}">
+                <a16:creationId xmlns:a16="http://schemas.microsoft.com/office/drawing/2014/main" id="{48652044-50B3-4759-91CA-4BF4DFB7F3B7}"/>
+              </a:ext>
+            </a:extLst>
+          </p:cNvPr>
+          <p:cNvGrpSpPr/>
+          <p:nvPr/>
+        </p:nvGrpSpPr>
+        <p:grpSpPr>
+          <a:xfrm>
+            <a:off x="4988219" y="1718324"/>
+            <a:ext cx="2209178" cy="3411977"/>
+            <a:chOff x="4988219" y="1718324"/>
+            <a:chExt cx="2209178" cy="3411977"/>
+          </a:xfrm>
+        </p:grpSpPr>
+        <p:grpSp>
+          <p:nvGrpSpPr>
+            <p:cNvPr id="4" name="Group 3">
+              <a:extLst>
+                <a:ext uri="{FF2B5EF4-FFF2-40B4-BE49-F238E27FC236}">
+                  <a16:creationId xmlns:a16="http://schemas.microsoft.com/office/drawing/2014/main" id="{4A2D1062-0BC0-4E71-82C9-30BE02C1F88F}"/>
+                </a:ext>
+              </a:extLst>
+            </p:cNvPr>
+            <p:cNvGrpSpPr/>
+            <p:nvPr/>
+          </p:nvGrpSpPr>
+          <p:grpSpPr>
+            <a:xfrm>
+              <a:off x="4988219" y="1718324"/>
+              <a:ext cx="2066905" cy="3411977"/>
+              <a:chOff x="6096000" y="1718324"/>
+              <a:chExt cx="2066905" cy="3411977"/>
+            </a:xfrm>
+          </p:grpSpPr>
+          <p:sp>
+            <p:nvSpPr>
+              <p:cNvPr id="20" name="Rounded Rectangle 118">
+                <a:extLst>
+                  <a:ext uri="{FF2B5EF4-FFF2-40B4-BE49-F238E27FC236}">
+                    <a16:creationId xmlns:a16="http://schemas.microsoft.com/office/drawing/2014/main" id="{1B4DEA2D-306E-4B05-9E49-1AB36029DB1D}"/>
+                  </a:ext>
+                </a:extLst>
+              </p:cNvPr>
+              <p:cNvSpPr/>
+              <p:nvPr/>
+            </p:nvSpPr>
+            <p:spPr>
+              <a:xfrm>
+                <a:off x="6096000" y="1725085"/>
+                <a:ext cx="2066905" cy="3405216"/>
+              </a:xfrm>
+              <a:prstGeom prst="roundRect">
+                <a:avLst>
+                  <a:gd name="adj" fmla="val 7949"/>
+                </a:avLst>
+              </a:prstGeom>
+              <a:solidFill>
+                <a:schemeClr val="bg1">
+                  <a:lumMod val="95000"/>
+                </a:schemeClr>
+              </a:solidFill>
+              <a:ln w="3175" cmpd="sng"/>
+            </p:spPr>
+            <p:style>
+              <a:lnRef idx="1">
+                <a:schemeClr val="accent1"/>
+              </a:lnRef>
+              <a:fillRef idx="3">
+                <a:schemeClr val="accent1"/>
+              </a:fillRef>
+              <a:effectRef idx="2">
+                <a:schemeClr val="accent1"/>
+              </a:effectRef>
+              <a:fontRef idx="minor">
+                <a:schemeClr val="lt1"/>
+              </a:fontRef>
+            </p:style>
+            <p:txBody>
+              <a:bodyPr lIns="60942" tIns="804462" rIns="0" bIns="0" rtlCol="0" anchor="t"/>
+              <a:lstStyle/>
+              <a:p>
+                <a:pPr>
+                  <a:spcBef>
+                    <a:spcPts val="267"/>
+                  </a:spcBef>
+                </a:pPr>
+                <a:endParaRPr lang="en-US" sz="1200">
+                  <a:solidFill>
+                    <a:srgbClr val="000000"/>
+                  </a:solidFill>
+                  <a:latin typeface="Arial" panose="020B0604020202020204" pitchFamily="34" charset="0"/>
+                  <a:cs typeface="Arial" panose="020B0604020202020204" pitchFamily="34" charset="0"/>
+                </a:endParaRPr>
+              </a:p>
+              <a:p>
+                <a:pPr>
+                  <a:spcBef>
+                    <a:spcPts val="267"/>
+                  </a:spcBef>
+                </a:pPr>
+                <a:r>
+                  <a:rPr lang="en-US" sz="1200">
+                    <a:solidFill>
+                      <a:srgbClr val="000000"/>
+                    </a:solidFill>
+                    <a:latin typeface="Arial" panose="020B0604020202020204" pitchFamily="34" charset="0"/>
+                    <a:cs typeface="Arial" panose="020B0604020202020204" pitchFamily="34" charset="0"/>
+                  </a:rPr>
+                  <a:t>5 years of experience in Big Data, Analytics and Engineering. Expertise in handling large datasets &amp; creating optimized analytical solutions using various data science tools and languages like R &amp; Python.</a:t>
+                </a:r>
+              </a:p>
+              <a:p>
+                <a:pPr>
+                  <a:spcBef>
+                    <a:spcPts val="267"/>
+                  </a:spcBef>
+                </a:pPr>
+                <a:endParaRPr lang="en-US" sz="1300">
+                  <a:solidFill>
+                    <a:srgbClr val="000000"/>
+                  </a:solidFill>
+                </a:endParaRPr>
+              </a:p>
+              <a:p>
+                <a:pPr>
+                  <a:spcBef>
+                    <a:spcPts val="267"/>
+                  </a:spcBef>
+                </a:pPr>
+                <a:endParaRPr lang="en-US" sz="1300">
+                  <a:solidFill>
+                    <a:prstClr val="black"/>
+                  </a:solidFill>
+                  <a:latin typeface="Calibri"/>
+                </a:endParaRPr>
+              </a:p>
+              <a:p>
+                <a:pPr>
+                  <a:spcBef>
+                    <a:spcPts val="267"/>
+                  </a:spcBef>
+                </a:pPr>
+                <a:endParaRPr lang="en-US" sz="1300">
+                  <a:solidFill>
+                    <a:prstClr val="black"/>
+                  </a:solidFill>
+                  <a:latin typeface="Calibri"/>
+                </a:endParaRPr>
+              </a:p>
+            </p:txBody>
+          </p:sp>
+          <p:sp>
+            <p:nvSpPr>
+              <p:cNvPr id="25" name="Text Box 4">
+                <a:extLst>
+                  <a:ext uri="{FF2B5EF4-FFF2-40B4-BE49-F238E27FC236}">
+                    <a16:creationId xmlns:a16="http://schemas.microsoft.com/office/drawing/2014/main" id="{C3461454-A2CF-4E0B-B87E-F071F89E084D}"/>
+                  </a:ext>
+                </a:extLst>
+              </p:cNvPr>
+              <p:cNvSpPr txBox="1">
+                <a:spLocks noChangeArrowheads="1"/>
+              </p:cNvSpPr>
+              <p:nvPr/>
+            </p:nvSpPr>
+            <p:spPr bwMode="auto">
+              <a:xfrm>
+                <a:off x="6113756" y="1718324"/>
+                <a:ext cx="2049148" cy="818326"/>
+              </a:xfrm>
+              <a:prstGeom prst="rect">
+                <a:avLst/>
+              </a:prstGeom>
+              <a:noFill/>
+              <a:ln>
+                <a:noFill/>
+              </a:ln>
+              <a:extLst>
+                <a:ext uri="{909E8E84-426E-40dd-AFC4-6F175D3DCCD1}">
+                  <a14:hiddenFill xmlns:a14="http://schemas.microsoft.com/office/drawing/2010/main" xmlns="">
+                    <a:solidFill>
+                      <a:srgbClr val="FFFFFF"/>
+                    </a:solidFill>
+                  </a14:hiddenFill>
+                </a:ext>
+                <a:ext uri="{91240B29-F687-4f45-9708-019B960494DF}">
+                  <a14:hiddenLine xmlns:a14="http://schemas.microsoft.com/office/drawing/2010/main" xmlns="" w="9525">
+                    <a:solidFill>
+                      <a:srgbClr val="000000"/>
+                    </a:solidFill>
+                    <a:miter lim="800000"/>
+                    <a:headEnd type="none" w="med" len="med"/>
+                    <a:tailEnd type="none" w="med" len="med"/>
+                  </a14:hiddenLine>
+                </a:ext>
+              </a:extLst>
+            </p:spPr>
+            <p:txBody>
+              <a:bodyPr rot="0" vert="horz" wrap="square" lIns="853197" tIns="121885" rIns="0" bIns="0" anchor="t" anchorCtr="0" upright="1">
+                <a:noAutofit/>
+              </a:bodyPr>
+              <a:lstStyle/>
+              <a:p>
+                <a:r>
+                  <a:rPr lang="en-US" sz="1600" b="1">
+                    <a:solidFill>
+                      <a:srgbClr val="0091D0"/>
+                    </a:solidFill>
+                    <a:latin typeface="Calibri"/>
+                    <a:ea typeface="Cambria"/>
+                    <a:cs typeface="Times New Roman"/>
+                  </a:rPr>
+                  <a:t>  Anuj Gupta</a:t>
+                </a:r>
+                <a:endParaRPr lang="en-US" sz="1600">
+                  <a:solidFill>
+                    <a:prstClr val="black"/>
+                  </a:solidFill>
+                  <a:latin typeface="Cambria"/>
+                  <a:ea typeface="Cambria"/>
+                  <a:cs typeface="Times New Roman"/>
+                </a:endParaRPr>
+              </a:p>
+            </p:txBody>
+          </p:sp>
+          <p:pic>
+            <p:nvPicPr>
+              <p:cNvPr id="27" name="Picture 20" descr="User Photo">
+                <a:extLst>
+                  <a:ext uri="{FF2B5EF4-FFF2-40B4-BE49-F238E27FC236}">
+                    <a16:creationId xmlns:a16="http://schemas.microsoft.com/office/drawing/2014/main" id="{2748FEBD-CB7A-4D65-AA30-D1A01B95B7E3}"/>
+                  </a:ext>
+                </a:extLst>
+              </p:cNvPr>
+              <p:cNvPicPr>
+                <a:picLocks noChangeArrowheads="1"/>
+              </p:cNvPicPr>
+              <p:nvPr/>
+            </p:nvPicPr>
+            <p:blipFill>
+              <a:blip r:embed="rId3" cstate="print">
+                <a:extLst>
+                  <a:ext uri="{28A0092B-C50C-407E-A947-70E740481C1C}">
+                    <a14:useLocalDpi xmlns:a14="http://schemas.microsoft.com/office/drawing/2010/main" val="0"/>
+                  </a:ext>
+                </a:extLst>
+              </a:blip>
+              <a:srcRect/>
+              <a:stretch>
+                <a:fillRect/>
+              </a:stretch>
+            </p:blipFill>
+            <p:spPr bwMode="auto">
+              <a:xfrm>
+                <a:off x="6176091" y="1799428"/>
+                <a:ext cx="728048" cy="728165"/>
+              </a:xfrm>
+              <a:prstGeom prst="ellipse">
+                <a:avLst/>
+              </a:prstGeom>
+              <a:ln w="28575" cap="rnd">
+                <a:solidFill>
+                  <a:schemeClr val="tx2">
+                    <a:lumMod val="60000"/>
+                    <a:lumOff val="40000"/>
+                  </a:schemeClr>
+                </a:solidFill>
+              </a:ln>
+              <a:effectLst/>
+              <a:extLst>
+                <a:ext uri="{909E8E84-426E-40dd-AFC4-6F175D3DCCD1}">
+                  <a14:hiddenFill xmlns="" xmlns:a14="http://schemas.microsoft.com/office/drawing/2010/main">
+                    <a:solidFill>
+                      <a:srgbClr val="FFFFFF"/>
+                    </a:solidFill>
+                  </a14:hiddenFill>
+                </a:ext>
+              </a:extLst>
+            </p:spPr>
+          </p:pic>
+        </p:grpSp>
+        <p:sp>
+          <p:nvSpPr>
+            <p:cNvPr id="34" name="TextBox 33">
+              <a:extLst>
+                <a:ext uri="{FF2B5EF4-FFF2-40B4-BE49-F238E27FC236}">
+                  <a16:creationId xmlns:a16="http://schemas.microsoft.com/office/drawing/2014/main" id="{E0E1F504-6E68-4357-973B-21F330E679A5}"/>
+                </a:ext>
+              </a:extLst>
+            </p:cNvPr>
+            <p:cNvSpPr txBox="1"/>
+            <p:nvPr/>
+          </p:nvSpPr>
+          <p:spPr>
+            <a:xfrm>
+              <a:off x="5005975" y="4679547"/>
+              <a:ext cx="2191422" cy="276999"/>
+            </a:xfrm>
+            <a:prstGeom prst="rect">
+              <a:avLst/>
+            </a:prstGeom>
+            <a:noFill/>
+          </p:spPr>
+          <p:txBody>
+            <a:bodyPr wrap="square" rtlCol="0">
+              <a:spAutoFit/>
+            </a:bodyPr>
+            <a:lstStyle/>
+            <a:p>
+              <a:pPr>
+                <a:spcBef>
+                  <a:spcPts val="267"/>
+                </a:spcBef>
+              </a:pPr>
+              <a:r>
+                <a:rPr lang="en-US" sz="1200">
+                  <a:solidFill>
+                    <a:srgbClr val="000000"/>
+                  </a:solidFill>
+                </a:rPr>
+                <a:t>B.E. – Information Technology</a:t>
+              </a:r>
+            </a:p>
+          </p:txBody>
+        </p:sp>
+      </p:grpSp>
+      <p:grpSp>
+        <p:nvGrpSpPr>
+          <p:cNvPr id="3" name="Group 2">
+            <a:extLst>
+              <a:ext uri="{FF2B5EF4-FFF2-40B4-BE49-F238E27FC236}">
+                <a16:creationId xmlns:a16="http://schemas.microsoft.com/office/drawing/2014/main" id="{BD53C3DF-B183-4541-8608-F7F8D17DC193}"/>
+              </a:ext>
+            </a:extLst>
+          </p:cNvPr>
+          <p:cNvGrpSpPr/>
+          <p:nvPr/>
+        </p:nvGrpSpPr>
+        <p:grpSpPr>
+          <a:xfrm>
+            <a:off x="8329760" y="1742170"/>
+            <a:ext cx="2566835" cy="3469470"/>
+            <a:chOff x="8329760" y="1742170"/>
+            <a:chExt cx="2566835" cy="3469470"/>
+          </a:xfrm>
+        </p:grpSpPr>
+        <p:sp>
+          <p:nvSpPr>
+            <p:cNvPr id="18" name="Rounded Rectangle 118">
+              <a:extLst>
+                <a:ext uri="{FF2B5EF4-FFF2-40B4-BE49-F238E27FC236}">
+                  <a16:creationId xmlns:a16="http://schemas.microsoft.com/office/drawing/2014/main" id="{EFC6C753-BC76-4716-82BC-D0155DA2DC65}"/>
+                </a:ext>
+              </a:extLst>
+            </p:cNvPr>
+            <p:cNvSpPr/>
+            <p:nvPr/>
+          </p:nvSpPr>
+          <p:spPr>
+            <a:xfrm>
+              <a:off x="8329760" y="1748931"/>
+              <a:ext cx="2066905" cy="3405216"/>
+            </a:xfrm>
+            <a:prstGeom prst="roundRect">
+              <a:avLst>
+                <a:gd name="adj" fmla="val 7949"/>
+              </a:avLst>
+            </a:prstGeom>
+            <a:solidFill>
+              <a:schemeClr val="bg1">
+                <a:lumMod val="95000"/>
+              </a:schemeClr>
+            </a:solidFill>
+            <a:ln w="3175" cmpd="sng"/>
+          </p:spPr>
+          <p:style>
+            <a:lnRef idx="1">
+              <a:schemeClr val="accent1"/>
+            </a:lnRef>
+            <a:fillRef idx="3">
+              <a:schemeClr val="accent1"/>
+            </a:fillRef>
+            <a:effectRef idx="2">
+              <a:schemeClr val="accent1"/>
+            </a:effectRef>
+            <a:fontRef idx="minor">
+              <a:schemeClr val="lt1"/>
+            </a:fontRef>
+          </p:style>
+          <p:txBody>
+            <a:bodyPr lIns="60942" tIns="804462" rIns="0" bIns="0" rtlCol="0" anchor="t"/>
+            <a:lstStyle/>
+            <a:p>
+              <a:pPr defTabSz="1218987">
+                <a:spcBef>
+                  <a:spcPts val="267"/>
+                </a:spcBef>
+              </a:pPr>
+              <a:endParaRPr lang="en-US" sz="1200">
+                <a:solidFill>
+                  <a:srgbClr val="000000"/>
+                </a:solidFill>
+                <a:latin typeface="Arial" panose="020B0604020202020204" pitchFamily="34" charset="0"/>
+                <a:cs typeface="Arial" panose="020B0604020202020204" pitchFamily="34" charset="0"/>
+              </a:endParaRPr>
+            </a:p>
+            <a:p>
+              <a:pPr defTabSz="1218987">
+                <a:spcBef>
+                  <a:spcPts val="267"/>
+                </a:spcBef>
+              </a:pPr>
+              <a:r>
+                <a:rPr lang="en-US" sz="1200">
+                  <a:solidFill>
+                    <a:srgbClr val="000000"/>
+                  </a:solidFill>
+                  <a:latin typeface="Arial" panose="020B0604020202020204" pitchFamily="34" charset="0"/>
+                  <a:cs typeface="Arial" panose="020B0604020202020204" pitchFamily="34" charset="0"/>
+                </a:rPr>
+                <a:t>4+ years of experience in Big Data analytics with experience in creating end to end data pipelines, designing text analytics and predictive analytics solutions. Expertise in Python, Spark and Hadoop ecosystem. </a:t>
+              </a:r>
+            </a:p>
+            <a:p>
+              <a:pPr>
+                <a:spcBef>
+                  <a:spcPts val="267"/>
+                </a:spcBef>
+              </a:pPr>
+              <a:endParaRPr lang="en-US" sz="1400">
+                <a:solidFill>
+                  <a:srgbClr val="000000"/>
+                </a:solidFill>
+              </a:endParaRPr>
+            </a:p>
+          </p:txBody>
+        </p:sp>
+        <p:sp>
+          <p:nvSpPr>
+            <p:cNvPr id="19" name="Text Box 4">
+              <a:extLst>
+                <a:ext uri="{FF2B5EF4-FFF2-40B4-BE49-F238E27FC236}">
+                  <a16:creationId xmlns:a16="http://schemas.microsoft.com/office/drawing/2014/main" id="{83FB3416-5781-4278-B991-0DEA02F1591F}"/>
+                </a:ext>
+              </a:extLst>
+            </p:cNvPr>
+            <p:cNvSpPr txBox="1">
+              <a:spLocks noChangeArrowheads="1"/>
+            </p:cNvSpPr>
+            <p:nvPr/>
+          </p:nvSpPr>
+          <p:spPr bwMode="auto">
+            <a:xfrm>
+              <a:off x="8347516" y="1742170"/>
+              <a:ext cx="2049148" cy="818326"/>
+            </a:xfrm>
+            <a:prstGeom prst="rect">
+              <a:avLst/>
+            </a:prstGeom>
+            <a:noFill/>
+            <a:ln>
+              <a:noFill/>
+            </a:ln>
+            <a:extLst>
+              <a:ext uri="{909E8E84-426E-40dd-AFC4-6F175D3DCCD1}">
+                <a14:hiddenFill xmlns:a14="http://schemas.microsoft.com/office/drawing/2010/main" xmlns="">
+                  <a:solidFill>
+                    <a:srgbClr val="FFFFFF"/>
+                  </a:solidFill>
+                </a14:hiddenFill>
+              </a:ext>
+              <a:ext uri="{91240B29-F687-4f45-9708-019B960494DF}">
+                <a14:hiddenLine xmlns:a14="http://schemas.microsoft.com/office/drawing/2010/main" xmlns="" w="9525">
+                  <a:solidFill>
+                    <a:srgbClr val="000000"/>
+                  </a:solidFill>
+                  <a:miter lim="800000"/>
+                  <a:headEnd type="none" w="med" len="med"/>
+                  <a:tailEnd type="none" w="med" len="med"/>
+                </a14:hiddenLine>
+              </a:ext>
+            </a:extLst>
+          </p:spPr>
+          <p:txBody>
+            <a:bodyPr rot="0" vert="horz" wrap="square" lIns="853197" tIns="121885" rIns="0" bIns="0" anchor="t" anchorCtr="0" upright="1">
+              <a:noAutofit/>
+            </a:bodyPr>
+            <a:lstStyle/>
+            <a:p>
+              <a:r>
+                <a:rPr lang="en-US" sz="1600" b="1">
+                  <a:solidFill>
+                    <a:srgbClr val="0091D0"/>
+                  </a:solidFill>
+                  <a:latin typeface="Calibri"/>
+                  <a:ea typeface="Cambria"/>
+                  <a:cs typeface="Times New Roman"/>
+                </a:rPr>
+                <a:t>  Achal Sharma</a:t>
+              </a:r>
+              <a:endParaRPr lang="en-US" sz="1600">
+                <a:solidFill>
+                  <a:prstClr val="black"/>
+                </a:solidFill>
+                <a:latin typeface="Cambria"/>
+                <a:ea typeface="Cambria"/>
+                <a:cs typeface="Times New Roman"/>
+              </a:endParaRPr>
+            </a:p>
+          </p:txBody>
+        </p:sp>
+        <p:pic>
+          <p:nvPicPr>
+            <p:cNvPr id="28" name="Picture 27">
+              <a:extLst>
+                <a:ext uri="{FF2B5EF4-FFF2-40B4-BE49-F238E27FC236}">
+                  <a16:creationId xmlns:a16="http://schemas.microsoft.com/office/drawing/2014/main" id="{C7D150B2-1EE1-49E8-9A50-AC47824B3BED}"/>
+                </a:ext>
+              </a:extLst>
+            </p:cNvPr>
+            <p:cNvPicPr>
+              <a:picLocks/>
+            </p:cNvPicPr>
+            <p:nvPr/>
+          </p:nvPicPr>
+          <p:blipFill>
+            <a:blip r:embed="rId4">
+              <a:extLst>
+                <a:ext uri="{28A0092B-C50C-407E-A947-70E740481C1C}">
+                  <a14:useLocalDpi xmlns:a14="http://schemas.microsoft.com/office/drawing/2010/main" val="0"/>
+                </a:ext>
+              </a:extLst>
+            </a:blip>
+            <a:stretch>
+              <a:fillRect/>
+            </a:stretch>
+          </p:blipFill>
+          <p:spPr>
+            <a:xfrm>
+              <a:off x="8410686" y="1801173"/>
+              <a:ext cx="731520" cy="731520"/>
+            </a:xfrm>
+            <a:prstGeom prst="ellipse">
+              <a:avLst/>
+            </a:prstGeom>
+            <a:ln w="28575" cap="rnd">
+              <a:solidFill>
+                <a:schemeClr val="tx2">
+                  <a:lumMod val="60000"/>
+                  <a:lumOff val="40000"/>
+                </a:schemeClr>
+              </a:solidFill>
+            </a:ln>
+            <a:effectLst/>
+          </p:spPr>
+        </p:pic>
+        <p:sp>
+          <p:nvSpPr>
+            <p:cNvPr id="36" name="TextBox 35">
+              <a:extLst>
+                <a:ext uri="{FF2B5EF4-FFF2-40B4-BE49-F238E27FC236}">
+                  <a16:creationId xmlns:a16="http://schemas.microsoft.com/office/drawing/2014/main" id="{F7D02255-0BCE-43DC-BC45-1D9E4AEBF1D5}"/>
+                </a:ext>
+              </a:extLst>
+            </p:cNvPr>
+            <p:cNvSpPr txBox="1"/>
+            <p:nvPr/>
+          </p:nvSpPr>
+          <p:spPr>
+            <a:xfrm>
+              <a:off x="8352007" y="4749975"/>
+              <a:ext cx="2544588" cy="461665"/>
+            </a:xfrm>
+            <a:prstGeom prst="rect">
+              <a:avLst/>
+            </a:prstGeom>
+            <a:noFill/>
+          </p:spPr>
+          <p:txBody>
+            <a:bodyPr wrap="square" rtlCol="0">
+              <a:spAutoFit/>
+            </a:bodyPr>
+            <a:lstStyle/>
+            <a:p>
+              <a:r>
+                <a:rPr lang="en-US" sz="1200">
+                  <a:solidFill>
+                    <a:srgbClr val="000000"/>
+                  </a:solidFill>
+                </a:rPr>
+                <a:t>B. Tech. Electronics &amp; Comm.</a:t>
+              </a:r>
+              <a:endParaRPr lang="en-US" sz="1200">
+                <a:solidFill>
+                  <a:prstClr val="black"/>
+                </a:solidFill>
+              </a:endParaRPr>
+            </a:p>
+            <a:p>
+              <a:endParaRPr lang="en-US" sz="1200"/>
+            </a:p>
+          </p:txBody>
+        </p:sp>
+      </p:grpSp>
+    </p:spTree>
+    <p:extLst>
+      <p:ext uri="{BB962C8B-B14F-4D97-AF65-F5344CB8AC3E}">
+        <p14:creationId xmlns:p14="http://schemas.microsoft.com/office/powerpoint/2010/main" val="2511045304"/>
       </p:ext>
     </p:extLst>
   </p:cSld>

</xml_diff>

<commit_message>
chages made to final presentation
</commit_message>
<xml_diff>
--- a/docs/SAMHAR COVID-19 Solution - Activity Recognition.pptx
+++ b/docs/SAMHAR COVID-19 Solution - Activity Recognition.pptx
@@ -123,13 +123,188 @@
 <file path=ppt/revisionInfo.xml><?xml version="1.0" encoding="utf-8"?>
 <p1510:revInfo xmlns:a="http://schemas.openxmlformats.org/drawingml/2006/main" xmlns:r="http://schemas.openxmlformats.org/officeDocument/2006/relationships" xmlns:p1510="http://schemas.microsoft.com/office/powerpoint/2015/10/main">
   <p1510:revLst>
-    <p1510:client id="{8634FAA0-F321-47C4-B938-829705971C98}" v="24" dt="2020-04-20T09:20:52.671"/>
+    <p1510:client id="{D9F7F0ED-2A10-4D69-B898-499873E4EFEE}" v="9" dt="2020-05-08T11:32:28.622"/>
   </p1510:revLst>
 </p1510:revInfo>
 </file>
 
 <file path=ppt/changesInfos/changesInfo1.xml><?xml version="1.0" encoding="utf-8"?>
 <pc:chgInfo xmlns:a="http://schemas.openxmlformats.org/drawingml/2006/main" xmlns:r="http://schemas.openxmlformats.org/officeDocument/2006/relationships" xmlns:ac="http://schemas.microsoft.com/office/drawing/2013/main/command" xmlns:pc="http://schemas.microsoft.com/office/powerpoint/2013/main/command">
+  <pc:docChgLst>
+    <pc:chgData name="Sharma, Achal" userId="7a8c8a96-1d6e-4064-bdb8-4b85ae52114b" providerId="ADAL" clId="{D9F7F0ED-2A10-4D69-B898-499873E4EFEE}"/>
+    <pc:docChg chg="undo custSel modSld">
+      <pc:chgData name="Sharma, Achal" userId="7a8c8a96-1d6e-4064-bdb8-4b85ae52114b" providerId="ADAL" clId="{D9F7F0ED-2A10-4D69-B898-499873E4EFEE}" dt="2020-05-08T11:32:28.621" v="260" actId="408"/>
+      <pc:docMkLst>
+        <pc:docMk/>
+      </pc:docMkLst>
+      <pc:sldChg chg="modSp">
+        <pc:chgData name="Sharma, Achal" userId="7a8c8a96-1d6e-4064-bdb8-4b85ae52114b" providerId="ADAL" clId="{D9F7F0ED-2A10-4D69-B898-499873E4EFEE}" dt="2020-05-08T11:02:42.430" v="14" actId="20577"/>
+        <pc:sldMkLst>
+          <pc:docMk/>
+          <pc:sldMk cId="2799414268" sldId="256"/>
+        </pc:sldMkLst>
+        <pc:spChg chg="mod">
+          <ac:chgData name="Sharma, Achal" userId="7a8c8a96-1d6e-4064-bdb8-4b85ae52114b" providerId="ADAL" clId="{D9F7F0ED-2A10-4D69-B898-499873E4EFEE}" dt="2020-05-08T11:02:42.430" v="14" actId="20577"/>
+          <ac:spMkLst>
+            <pc:docMk/>
+            <pc:sldMk cId="2799414268" sldId="256"/>
+            <ac:spMk id="3" creationId="{2949EAC8-434D-4619-891E-819175EC60AD}"/>
+          </ac:spMkLst>
+        </pc:spChg>
+      </pc:sldChg>
+      <pc:sldChg chg="addSp delSp modSp">
+        <pc:chgData name="Sharma, Achal" userId="7a8c8a96-1d6e-4064-bdb8-4b85ae52114b" providerId="ADAL" clId="{D9F7F0ED-2A10-4D69-B898-499873E4EFEE}" dt="2020-05-08T11:32:28.621" v="260" actId="408"/>
+        <pc:sldMkLst>
+          <pc:docMk/>
+          <pc:sldMk cId="2511045304" sldId="1026"/>
+        </pc:sldMkLst>
+        <pc:spChg chg="mod topLvl">
+          <ac:chgData name="Sharma, Achal" userId="7a8c8a96-1d6e-4064-bdb8-4b85ae52114b" providerId="ADAL" clId="{D9F7F0ED-2A10-4D69-B898-499873E4EFEE}" dt="2020-05-08T11:07:43.942" v="60" actId="164"/>
+          <ac:spMkLst>
+            <pc:docMk/>
+            <pc:sldMk cId="2511045304" sldId="1026"/>
+            <ac:spMk id="18" creationId="{EFC6C753-BC76-4716-82BC-D0155DA2DC65}"/>
+          </ac:spMkLst>
+        </pc:spChg>
+        <pc:spChg chg="mod topLvl">
+          <ac:chgData name="Sharma, Achal" userId="7a8c8a96-1d6e-4064-bdb8-4b85ae52114b" providerId="ADAL" clId="{D9F7F0ED-2A10-4D69-B898-499873E4EFEE}" dt="2020-05-08T11:07:43.942" v="60" actId="164"/>
+          <ac:spMkLst>
+            <pc:docMk/>
+            <pc:sldMk cId="2511045304" sldId="1026"/>
+            <ac:spMk id="19" creationId="{83FB3416-5781-4278-B991-0DEA02F1591F}"/>
+          </ac:spMkLst>
+        </pc:spChg>
+        <pc:spChg chg="mod">
+          <ac:chgData name="Sharma, Achal" userId="7a8c8a96-1d6e-4064-bdb8-4b85ae52114b" providerId="ADAL" clId="{D9F7F0ED-2A10-4D69-B898-499873E4EFEE}" dt="2020-05-08T11:31:49.248" v="259" actId="20577"/>
+          <ac:spMkLst>
+            <pc:docMk/>
+            <pc:sldMk cId="2511045304" sldId="1026"/>
+            <ac:spMk id="22" creationId="{9AB44D4F-F51E-4D8B-AA49-9B8056B58327}"/>
+          </ac:spMkLst>
+        </pc:spChg>
+        <pc:spChg chg="mod">
+          <ac:chgData name="Sharma, Achal" userId="7a8c8a96-1d6e-4064-bdb8-4b85ae52114b" providerId="ADAL" clId="{D9F7F0ED-2A10-4D69-B898-499873E4EFEE}" dt="2020-05-08T11:04:15.212" v="54" actId="108"/>
+          <ac:spMkLst>
+            <pc:docMk/>
+            <pc:sldMk cId="2511045304" sldId="1026"/>
+            <ac:spMk id="29" creationId="{B05B0D13-146C-4574-8A24-57AFFF8EFA22}"/>
+          </ac:spMkLst>
+        </pc:spChg>
+        <pc:spChg chg="add mod">
+          <ac:chgData name="Sharma, Achal" userId="7a8c8a96-1d6e-4064-bdb8-4b85ae52114b" providerId="ADAL" clId="{D9F7F0ED-2A10-4D69-B898-499873E4EFEE}" dt="2020-05-08T11:28:09.021" v="94" actId="120"/>
+          <ac:spMkLst>
+            <pc:docMk/>
+            <pc:sldMk cId="2511045304" sldId="1026"/>
+            <ac:spMk id="31" creationId="{703B009C-D8A2-4ACB-AFC2-53088760D632}"/>
+          </ac:spMkLst>
+        </pc:spChg>
+        <pc:spChg chg="mod">
+          <ac:chgData name="Sharma, Achal" userId="7a8c8a96-1d6e-4064-bdb8-4b85ae52114b" providerId="ADAL" clId="{D9F7F0ED-2A10-4D69-B898-499873E4EFEE}" dt="2020-05-08T11:28:17.183" v="95" actId="20577"/>
+          <ac:spMkLst>
+            <pc:docMk/>
+            <pc:sldMk cId="2511045304" sldId="1026"/>
+            <ac:spMk id="32" creationId="{83E96A3D-49EA-430C-8D79-18216568B44D}"/>
+          </ac:spMkLst>
+        </pc:spChg>
+        <pc:spChg chg="mod">
+          <ac:chgData name="Sharma, Achal" userId="7a8c8a96-1d6e-4064-bdb8-4b85ae52114b" providerId="ADAL" clId="{D9F7F0ED-2A10-4D69-B898-499873E4EFEE}" dt="2020-05-08T11:28:22.789" v="99" actId="20577"/>
+          <ac:spMkLst>
+            <pc:docMk/>
+            <pc:sldMk cId="2511045304" sldId="1026"/>
+            <ac:spMk id="34" creationId="{E0E1F504-6E68-4357-973B-21F330E679A5}"/>
+          </ac:spMkLst>
+        </pc:spChg>
+        <pc:spChg chg="mod topLvl">
+          <ac:chgData name="Sharma, Achal" userId="7a8c8a96-1d6e-4064-bdb8-4b85ae52114b" providerId="ADAL" clId="{D9F7F0ED-2A10-4D69-B898-499873E4EFEE}" dt="2020-05-08T11:07:43.942" v="60" actId="164"/>
+          <ac:spMkLst>
+            <pc:docMk/>
+            <pc:sldMk cId="2511045304" sldId="1026"/>
+            <ac:spMk id="36" creationId="{F7D02255-0BCE-43DC-BC45-1D9E4AEBF1D5}"/>
+          </ac:spMkLst>
+        </pc:spChg>
+        <pc:grpChg chg="del mod">
+          <ac:chgData name="Sharma, Achal" userId="7a8c8a96-1d6e-4064-bdb8-4b85ae52114b" providerId="ADAL" clId="{D9F7F0ED-2A10-4D69-B898-499873E4EFEE}" dt="2020-05-08T11:03:18.109" v="20" actId="165"/>
+          <ac:grpSpMkLst>
+            <pc:docMk/>
+            <pc:sldMk cId="2511045304" sldId="1026"/>
+            <ac:grpSpMk id="3" creationId="{BD53C3DF-B183-4541-8608-F7F8D17DC193}"/>
+          </ac:grpSpMkLst>
+        </pc:grpChg>
+        <pc:grpChg chg="mod">
+          <ac:chgData name="Sharma, Achal" userId="7a8c8a96-1d6e-4064-bdb8-4b85ae52114b" providerId="ADAL" clId="{D9F7F0ED-2A10-4D69-B898-499873E4EFEE}" dt="2020-05-08T11:32:28.621" v="260" actId="408"/>
+          <ac:grpSpMkLst>
+            <pc:docMk/>
+            <pc:sldMk cId="2511045304" sldId="1026"/>
+            <ac:grpSpMk id="4" creationId="{4A2D1062-0BC0-4E71-82C9-30BE02C1F88F}"/>
+          </ac:grpSpMkLst>
+        </pc:grpChg>
+        <pc:grpChg chg="add del mod">
+          <ac:chgData name="Sharma, Achal" userId="7a8c8a96-1d6e-4064-bdb8-4b85ae52114b" providerId="ADAL" clId="{D9F7F0ED-2A10-4D69-B898-499873E4EFEE}" dt="2020-05-08T11:07:36.810" v="59" actId="165"/>
+          <ac:grpSpMkLst>
+            <pc:docMk/>
+            <pc:sldMk cId="2511045304" sldId="1026"/>
+            <ac:grpSpMk id="5" creationId="{FCBC6233-B89A-4ACD-BD4A-FB90C98B3087}"/>
+          </ac:grpSpMkLst>
+        </pc:grpChg>
+        <pc:grpChg chg="mod">
+          <ac:chgData name="Sharma, Achal" userId="7a8c8a96-1d6e-4064-bdb8-4b85ae52114b" providerId="ADAL" clId="{D9F7F0ED-2A10-4D69-B898-499873E4EFEE}" dt="2020-05-08T11:32:28.621" v="260" actId="408"/>
+          <ac:grpSpMkLst>
+            <pc:docMk/>
+            <pc:sldMk cId="2511045304" sldId="1026"/>
+            <ac:grpSpMk id="6" creationId="{BB32AC8A-7233-492C-BC9A-A0AF7D96A2E1}"/>
+          </ac:grpSpMkLst>
+        </pc:grpChg>
+        <pc:grpChg chg="mod">
+          <ac:chgData name="Sharma, Achal" userId="7a8c8a96-1d6e-4064-bdb8-4b85ae52114b" providerId="ADAL" clId="{D9F7F0ED-2A10-4D69-B898-499873E4EFEE}" dt="2020-05-08T11:32:28.621" v="260" actId="408"/>
+          <ac:grpSpMkLst>
+            <pc:docMk/>
+            <pc:sldMk cId="2511045304" sldId="1026"/>
+            <ac:grpSpMk id="7" creationId="{48652044-50B3-4759-91CA-4BF4DFB7F3B7}"/>
+          </ac:grpSpMkLst>
+        </pc:grpChg>
+        <pc:grpChg chg="add mod">
+          <ac:chgData name="Sharma, Achal" userId="7a8c8a96-1d6e-4064-bdb8-4b85ae52114b" providerId="ADAL" clId="{D9F7F0ED-2A10-4D69-B898-499873E4EFEE}" dt="2020-05-08T11:32:28.621" v="260" actId="408"/>
+          <ac:grpSpMkLst>
+            <pc:docMk/>
+            <pc:sldMk cId="2511045304" sldId="1026"/>
+            <ac:grpSpMk id="8" creationId="{8F6931E5-A19D-43B6-801E-0A2842C75294}"/>
+          </ac:grpSpMkLst>
+        </pc:grpChg>
+        <pc:grpChg chg="add mod">
+          <ac:chgData name="Sharma, Achal" userId="7a8c8a96-1d6e-4064-bdb8-4b85ae52114b" providerId="ADAL" clId="{D9F7F0ED-2A10-4D69-B898-499873E4EFEE}" dt="2020-05-08T11:32:28.621" v="260" actId="408"/>
+          <ac:grpSpMkLst>
+            <pc:docMk/>
+            <pc:sldMk cId="2511045304" sldId="1026"/>
+            <ac:grpSpMk id="21" creationId="{A006BC08-22C1-4A4C-BB1E-1F6688841B4E}"/>
+          </ac:grpSpMkLst>
+        </pc:grpChg>
+        <pc:graphicFrameChg chg="add del">
+          <ac:chgData name="Sharma, Achal" userId="7a8c8a96-1d6e-4064-bdb8-4b85ae52114b" providerId="ADAL" clId="{D9F7F0ED-2A10-4D69-B898-499873E4EFEE}" dt="2020-05-08T11:31:11.814" v="153"/>
+          <ac:graphicFrameMkLst>
+            <pc:docMk/>
+            <pc:sldMk cId="2511045304" sldId="1026"/>
+            <ac:graphicFrameMk id="9" creationId="{ACB773E0-A653-4699-9907-C0D787824656}"/>
+          </ac:graphicFrameMkLst>
+        </pc:graphicFrameChg>
+        <pc:picChg chg="mod topLvl">
+          <ac:chgData name="Sharma, Achal" userId="7a8c8a96-1d6e-4064-bdb8-4b85ae52114b" providerId="ADAL" clId="{D9F7F0ED-2A10-4D69-B898-499873E4EFEE}" dt="2020-05-08T11:07:43.942" v="60" actId="164"/>
+          <ac:picMkLst>
+            <pc:docMk/>
+            <pc:sldMk cId="2511045304" sldId="1026"/>
+            <ac:picMk id="28" creationId="{C7D150B2-1EE1-49E8-9A50-AC47824B3BED}"/>
+          </ac:picMkLst>
+        </pc:picChg>
+        <pc:picChg chg="mod">
+          <ac:chgData name="Sharma, Achal" userId="7a8c8a96-1d6e-4064-bdb8-4b85ae52114b" providerId="ADAL" clId="{D9F7F0ED-2A10-4D69-B898-499873E4EFEE}" dt="2020-05-08T11:07:14.455" v="55" actId="14826"/>
+          <ac:picMkLst>
+            <pc:docMk/>
+            <pc:sldMk cId="2511045304" sldId="1026"/>
+            <ac:picMk id="30" creationId="{9D831DBE-B372-466D-9B9A-3E4C958531F0}"/>
+          </ac:picMkLst>
+        </pc:picChg>
+      </pc:sldChg>
+    </pc:docChg>
+  </pc:docChgLst>
   <pc:docChgLst>
     <pc:chgData name="Sharma, Achal" userId="7a8c8a96-1d6e-4064-bdb8-4b85ae52114b" providerId="ADAL" clId="{AA45C496-9D8C-4FD6-8726-8C43214DD486}"/>
     <pc:docChg chg="delSld">
@@ -3279,7 +3454,7 @@
           <a:p>
             <a:fld id="{E99D717D-C6B6-47A3-9723-1818B8E12CFF}" type="datetimeFigureOut">
               <a:rPr lang="en-US" smtClean="0"/>
-              <a:t>4/20/2020</a:t>
+              <a:t>5/8/2020</a:t>
             </a:fld>
             <a:endParaRPr lang="en-US"/>
           </a:p>
@@ -4058,14 +4233,14 @@
           </a:ln>
           <a:extLst>
             <a:ext uri="{909E8E84-426E-40dd-AFC4-6F175D3DCCD1}">
-              <a14:hiddenFill xmlns:a14="http://schemas.microsoft.com/office/drawing/2010/main" xmlns="">
+              <a14:hiddenFill xmlns="" xmlns:a14="http://schemas.microsoft.com/office/drawing/2010/main">
                 <a:solidFill>
                   <a:srgbClr val="FFFFFF"/>
                 </a:solidFill>
               </a14:hiddenFill>
             </a:ext>
             <a:ext uri="{91240B29-F687-4f45-9708-019B960494DF}">
-              <a14:hiddenLine xmlns:a14="http://schemas.microsoft.com/office/drawing/2010/main" xmlns="" w="9525">
+              <a14:hiddenLine xmlns="" xmlns:a14="http://schemas.microsoft.com/office/drawing/2010/main" w="9525">
                 <a:solidFill>
                   <a:srgbClr val="000000"/>
                 </a:solidFill>
@@ -4523,14 +4698,14 @@
           </a:ln>
           <a:extLst>
             <a:ext uri="{909E8E84-426E-40dd-AFC4-6F175D3DCCD1}">
-              <a14:hiddenFill xmlns:a14="http://schemas.microsoft.com/office/drawing/2010/main" xmlns="">
+              <a14:hiddenFill xmlns="" xmlns:a14="http://schemas.microsoft.com/office/drawing/2010/main">
                 <a:solidFill>
                   <a:srgbClr val="FFFFFF"/>
                 </a:solidFill>
               </a14:hiddenFill>
             </a:ext>
             <a:ext uri="{91240B29-F687-4f45-9708-019B960494DF}">
-              <a14:hiddenLine xmlns:a14="http://schemas.microsoft.com/office/drawing/2010/main" xmlns="" w="9525">
+              <a14:hiddenLine xmlns="" xmlns:a14="http://schemas.microsoft.com/office/drawing/2010/main" w="9525">
                 <a:solidFill>
                   <a:srgbClr val="000000"/>
                 </a:solidFill>
@@ -4636,14 +4811,14 @@
           </a:ln>
           <a:extLst>
             <a:ext uri="{909E8E84-426E-40dd-AFC4-6F175D3DCCD1}">
-              <a14:hiddenFill xmlns:a14="http://schemas.microsoft.com/office/drawing/2010/main" xmlns="">
+              <a14:hiddenFill xmlns="" xmlns:a14="http://schemas.microsoft.com/office/drawing/2010/main">
                 <a:solidFill>
                   <a:srgbClr val="FFFFFF"/>
                 </a:solidFill>
               </a14:hiddenFill>
             </a:ext>
             <a:ext uri="{91240B29-F687-4f45-9708-019B960494DF}">
-              <a14:hiddenLine xmlns:a14="http://schemas.microsoft.com/office/drawing/2010/main" xmlns="" w="9525">
+              <a14:hiddenLine xmlns="" xmlns:a14="http://schemas.microsoft.com/office/drawing/2010/main" w="9525">
                 <a:solidFill>
                   <a:srgbClr val="000000"/>
                 </a:solidFill>
@@ -5042,7 +5217,7 @@
           <a:p>
             <a:fld id="{616743CD-69CB-4BA8-BEE4-D2135F9F1890}" type="datetimeFigureOut">
               <a:rPr lang="en-US" smtClean="0"/>
-              <a:t>4/20/2020</a:t>
+              <a:t>5/8/2020</a:t>
             </a:fld>
             <a:endParaRPr lang="en-US"/>
           </a:p>
@@ -5766,10 +5941,15 @@
           </a:p>
           <a:p>
             <a:r>
-              <a:rPr lang="en-US" sz="2000"/>
+              <a:rPr lang="en-US" sz="2000" dirty="0"/>
               <a:t>Anuj Gupta</a:t>
             </a:r>
-            <a:endParaRPr lang="en-US" sz="2000" dirty="0"/>
+          </a:p>
+          <a:p>
+            <a:r>
+              <a:rPr lang="en-US" sz="2000" dirty="0"/>
+              <a:t>Adarsh Agrawal</a:t>
+            </a:r>
           </a:p>
         </p:txBody>
       </p:sp>
@@ -8349,7 +8529,7 @@
         </p:nvGrpSpPr>
         <p:grpSpPr>
           <a:xfrm>
-            <a:off x="1514628" y="1732737"/>
+            <a:off x="609600" y="1799428"/>
             <a:ext cx="2198956" cy="3412869"/>
             <a:chOff x="1514628" y="1732737"/>
             <a:chExt cx="2198956" cy="3412869"/>
@@ -8488,14 +8668,14 @@
             </a:ln>
             <a:extLst>
               <a:ext uri="{909E8E84-426E-40dd-AFC4-6F175D3DCCD1}">
-                <a14:hiddenFill xmlns:a14="http://schemas.microsoft.com/office/drawing/2010/main" xmlns="">
+                <a14:hiddenFill xmlns="" xmlns:a14="http://schemas.microsoft.com/office/drawing/2010/main">
                   <a:solidFill>
                     <a:srgbClr val="FFFFFF"/>
                   </a:solidFill>
                 </a14:hiddenFill>
               </a:ext>
               <a:ext uri="{91240B29-F687-4f45-9708-019B960494DF}">
-                <a14:hiddenLine xmlns:a14="http://schemas.microsoft.com/office/drawing/2010/main" xmlns="" w="9525">
+                <a14:hiddenLine xmlns="" xmlns:a14="http://schemas.microsoft.com/office/drawing/2010/main" w="9525">
                   <a:solidFill>
                     <a:srgbClr val="000000"/>
                   </a:solidFill>
@@ -8583,7 +8763,7 @@
             <a:effectLst/>
             <a:extLst>
               <a:ext uri="{909E8E84-426E-40dd-AFC4-6F175D3DCCD1}">
-                <a14:hiddenFill xmlns="" xmlns:a14="http://schemas.microsoft.com/office/drawing/2010/main">
+                <a14:hiddenFill xmlns:a14="http://schemas.microsoft.com/office/drawing/2010/main" xmlns="">
                   <a:solidFill>
                     <a:srgbClr val="FFFFFF"/>
                   </a:solidFill>
@@ -8622,7 +8802,7 @@
             <a:p>
               <a:r>
                 <a:rPr lang="en-US" sz="1200" dirty="0"/>
-                <a:t>B.Tech. Computer Science</a:t>
+                <a:t>B. Tech. Computer Science</a:t>
               </a:r>
             </a:p>
           </p:txBody>
@@ -8642,7 +8822,7 @@
         </p:nvGrpSpPr>
         <p:grpSpPr>
           <a:xfrm>
-            <a:off x="4988219" y="1718324"/>
+            <a:off x="3413126" y="1799873"/>
             <a:ext cx="2209178" cy="3411977"/>
             <a:chOff x="4988219" y="1718324"/>
             <a:chExt cx="2209178" cy="3411977"/>
@@ -8813,14 +8993,14 @@
               </a:ln>
               <a:extLst>
                 <a:ext uri="{909E8E84-426E-40dd-AFC4-6F175D3DCCD1}">
-                  <a14:hiddenFill xmlns:a14="http://schemas.microsoft.com/office/drawing/2010/main" xmlns="">
+                  <a14:hiddenFill xmlns="" xmlns:a14="http://schemas.microsoft.com/office/drawing/2010/main">
                     <a:solidFill>
                       <a:srgbClr val="FFFFFF"/>
                     </a:solidFill>
                   </a14:hiddenFill>
                 </a:ext>
                 <a:ext uri="{91240B29-F687-4f45-9708-019B960494DF}">
-                  <a14:hiddenLine xmlns:a14="http://schemas.microsoft.com/office/drawing/2010/main" xmlns="" w="9525">
+                  <a14:hiddenLine xmlns="" xmlns:a14="http://schemas.microsoft.com/office/drawing/2010/main" w="9525">
                     <a:solidFill>
                       <a:srgbClr val="000000"/>
                     </a:solidFill>
@@ -8905,7 +9085,7 @@
               <a:effectLst/>
               <a:extLst>
                 <a:ext uri="{909E8E84-426E-40dd-AFC4-6F175D3DCCD1}">
-                  <a14:hiddenFill xmlns="" xmlns:a14="http://schemas.microsoft.com/office/drawing/2010/main">
+                  <a14:hiddenFill xmlns:a14="http://schemas.microsoft.com/office/drawing/2010/main" xmlns="">
                     <a:solidFill>
                       <a:srgbClr val="FFFFFF"/>
                     </a:solidFill>
@@ -8949,12 +9129,12 @@
                 </a:spcBef>
               </a:pPr>
               <a:r>
-                <a:rPr lang="en-US" sz="1200">
+                <a:rPr lang="en-US" sz="1200" dirty="0">
                   <a:solidFill>
                     <a:srgbClr val="000000"/>
                   </a:solidFill>
                 </a:rPr>
-                <a:t>B.E. – Information Technology</a:t>
+                <a:t>B.E. Information Technology</a:t>
               </a:r>
             </a:p>
           </p:txBody>
@@ -8962,10 +9142,10 @@
       </p:grpSp>
       <p:grpSp>
         <p:nvGrpSpPr>
-          <p:cNvPr id="3" name="Group 2">
+          <p:cNvPr id="8" name="Group 7">
             <a:extLst>
               <a:ext uri="{FF2B5EF4-FFF2-40B4-BE49-F238E27FC236}">
-                <a16:creationId xmlns:a16="http://schemas.microsoft.com/office/drawing/2014/main" id="{BD53C3DF-B183-4541-8608-F7F8D17DC193}"/>
+                <a16:creationId xmlns:a16="http://schemas.microsoft.com/office/drawing/2014/main" id="{8F6931E5-A19D-43B6-801E-0A2842C75294}"/>
               </a:ext>
             </a:extLst>
           </p:cNvPr>
@@ -8974,10 +9154,10 @@
         </p:nvGrpSpPr>
         <p:grpSpPr>
           <a:xfrm>
-            <a:off x="8329760" y="1742170"/>
-            <a:ext cx="2566835" cy="3469470"/>
-            <a:chOff x="8329760" y="1742170"/>
-            <a:chExt cx="2566835" cy="3469470"/>
+            <a:off x="6226874" y="1799428"/>
+            <a:ext cx="2066905" cy="3411977"/>
+            <a:chOff x="6094941" y="1799428"/>
+            <a:chExt cx="2066905" cy="3411977"/>
           </a:xfrm>
         </p:grpSpPr>
         <p:sp>
@@ -8994,7 +9174,7 @@
           </p:nvSpPr>
           <p:spPr>
             <a:xfrm>
-              <a:off x="8329760" y="1748931"/>
+              <a:off x="6094941" y="1806189"/>
               <a:ext cx="2066905" cy="3405216"/>
             </a:xfrm>
             <a:prstGeom prst="roundRect">
@@ -9032,7 +9212,7 @@
                   <a:spcPts val="267"/>
                 </a:spcBef>
               </a:pPr>
-              <a:endParaRPr lang="en-US" sz="1200">
+              <a:endParaRPr lang="en-US" sz="1200" dirty="0">
                 <a:solidFill>
                   <a:srgbClr val="000000"/>
                 </a:solidFill>
@@ -9047,7 +9227,7 @@
                 </a:spcBef>
               </a:pPr>
               <a:r>
-                <a:rPr lang="en-US" sz="1200">
+                <a:rPr lang="en-US" sz="1200" dirty="0">
                   <a:solidFill>
                     <a:srgbClr val="000000"/>
                   </a:solidFill>
@@ -9063,7 +9243,7 @@
                   <a:spcPts val="267"/>
                 </a:spcBef>
               </a:pPr>
-              <a:endParaRPr lang="en-US" sz="1400">
+              <a:endParaRPr lang="en-US" sz="1400" dirty="0">
                 <a:solidFill>
                   <a:srgbClr val="000000"/>
                 </a:solidFill>
@@ -9087,7 +9267,7 @@
           </p:nvSpPr>
           <p:spPr bwMode="auto">
             <a:xfrm>
-              <a:off x="8347516" y="1742170"/>
+              <a:off x="6112697" y="1799428"/>
               <a:ext cx="2049148" cy="818326"/>
             </a:xfrm>
             <a:prstGeom prst="rect">
@@ -9099,14 +9279,14 @@
             </a:ln>
             <a:extLst>
               <a:ext uri="{909E8E84-426E-40dd-AFC4-6F175D3DCCD1}">
-                <a14:hiddenFill xmlns:a14="http://schemas.microsoft.com/office/drawing/2010/main" xmlns="">
+                <a14:hiddenFill xmlns="" xmlns:a14="http://schemas.microsoft.com/office/drawing/2010/main">
                   <a:solidFill>
                     <a:srgbClr val="FFFFFF"/>
                   </a:solidFill>
                 </a14:hiddenFill>
               </a:ext>
               <a:ext uri="{91240B29-F687-4f45-9708-019B960494DF}">
-                <a14:hiddenLine xmlns:a14="http://schemas.microsoft.com/office/drawing/2010/main" xmlns="" w="9525">
+                <a14:hiddenLine xmlns="" xmlns:a14="http://schemas.microsoft.com/office/drawing/2010/main" w="9525">
                   <a:solidFill>
                     <a:srgbClr val="000000"/>
                   </a:solidFill>
@@ -9124,7 +9304,7 @@
             <a:lstStyle/>
             <a:p>
               <a:r>
-                <a:rPr lang="en-US" sz="1600" b="1">
+                <a:rPr lang="en-US" sz="1600" b="1" dirty="0">
                   <a:solidFill>
                     <a:srgbClr val="0091D0"/>
                   </a:solidFill>
@@ -9134,7 +9314,7 @@
                 </a:rPr>
                 <a:t>  Achal Sharma</a:t>
               </a:r>
-              <a:endParaRPr lang="en-US" sz="1600">
+              <a:endParaRPr lang="en-US" sz="1600" dirty="0">
                 <a:solidFill>
                   <a:prstClr val="black"/>
                 </a:solidFill>
@@ -9173,7 +9353,7 @@
           </p:blipFill>
           <p:spPr>
             <a:xfrm>
-              <a:off x="8410686" y="1801173"/>
+              <a:off x="6175867" y="1858431"/>
               <a:ext cx="731520" cy="731520"/>
             </a:xfrm>
             <a:prstGeom prst="ellipse">
@@ -9204,8 +9384,8 @@
           </p:nvSpPr>
           <p:spPr>
             <a:xfrm>
-              <a:off x="8352007" y="4749975"/>
-              <a:ext cx="2544588" cy="461665"/>
+              <a:off x="6110448" y="4735327"/>
+              <a:ext cx="2049148" cy="461665"/>
             </a:xfrm>
             <a:prstGeom prst="rect">
               <a:avLst/>
@@ -9218,26 +9398,306 @@
             </a:bodyPr>
             <a:lstStyle/>
             <a:p>
+              <a:pPr algn="ctr"/>
               <a:r>
-                <a:rPr lang="en-US" sz="1200">
+                <a:rPr lang="en-US" sz="1200" dirty="0">
                   <a:solidFill>
                     <a:srgbClr val="000000"/>
                   </a:solidFill>
                 </a:rPr>
                 <a:t>B. Tech. Electronics &amp; Comm.</a:t>
               </a:r>
-              <a:endParaRPr lang="en-US" sz="1200">
+              <a:endParaRPr lang="en-US" sz="1200" dirty="0">
                 <a:solidFill>
                   <a:prstClr val="black"/>
                 </a:solidFill>
               </a:endParaRPr>
             </a:p>
             <a:p>
-              <a:endParaRPr lang="en-US" sz="1200"/>
+              <a:endParaRPr lang="en-US" sz="1200" dirty="0"/>
             </a:p>
           </p:txBody>
         </p:sp>
       </p:grpSp>
+      <p:grpSp>
+        <p:nvGrpSpPr>
+          <p:cNvPr id="21" name="Group 20">
+            <a:extLst>
+              <a:ext uri="{FF2B5EF4-FFF2-40B4-BE49-F238E27FC236}">
+                <a16:creationId xmlns:a16="http://schemas.microsoft.com/office/drawing/2014/main" id="{A006BC08-22C1-4A4C-BB1E-1F6688841B4E}"/>
+              </a:ext>
+            </a:extLst>
+          </p:cNvPr>
+          <p:cNvGrpSpPr/>
+          <p:nvPr/>
+        </p:nvGrpSpPr>
+        <p:grpSpPr>
+          <a:xfrm>
+            <a:off x="8898350" y="1828620"/>
+            <a:ext cx="2066905" cy="3411977"/>
+            <a:chOff x="6422941" y="1771127"/>
+            <a:chExt cx="2066905" cy="3411977"/>
+          </a:xfrm>
+        </p:grpSpPr>
+        <p:sp>
+          <p:nvSpPr>
+            <p:cNvPr id="22" name="Rounded Rectangle 118">
+              <a:extLst>
+                <a:ext uri="{FF2B5EF4-FFF2-40B4-BE49-F238E27FC236}">
+                  <a16:creationId xmlns:a16="http://schemas.microsoft.com/office/drawing/2014/main" id="{9AB44D4F-F51E-4D8B-AA49-9B8056B58327}"/>
+                </a:ext>
+              </a:extLst>
+            </p:cNvPr>
+            <p:cNvSpPr/>
+            <p:nvPr/>
+          </p:nvSpPr>
+          <p:spPr>
+            <a:xfrm>
+              <a:off x="6422941" y="1777888"/>
+              <a:ext cx="2066905" cy="3405216"/>
+            </a:xfrm>
+            <a:prstGeom prst="roundRect">
+              <a:avLst>
+                <a:gd name="adj" fmla="val 7949"/>
+              </a:avLst>
+            </a:prstGeom>
+            <a:solidFill>
+              <a:schemeClr val="bg1">
+                <a:lumMod val="95000"/>
+              </a:schemeClr>
+            </a:solidFill>
+            <a:ln w="3175" cmpd="sng"/>
+          </p:spPr>
+          <p:style>
+            <a:lnRef idx="1">
+              <a:schemeClr val="accent1"/>
+            </a:lnRef>
+            <a:fillRef idx="3">
+              <a:schemeClr val="accent1"/>
+            </a:fillRef>
+            <a:effectRef idx="2">
+              <a:schemeClr val="accent1"/>
+            </a:effectRef>
+            <a:fontRef idx="minor">
+              <a:schemeClr val="lt1"/>
+            </a:fontRef>
+          </p:style>
+          <p:txBody>
+            <a:bodyPr lIns="60942" tIns="804462" rIns="0" bIns="0" rtlCol="0" anchor="t"/>
+            <a:lstStyle/>
+            <a:p>
+              <a:pPr defTabSz="1218987">
+                <a:spcBef>
+                  <a:spcPts val="267"/>
+                </a:spcBef>
+              </a:pPr>
+              <a:endParaRPr lang="en-US" sz="1200" dirty="0">
+                <a:solidFill>
+                  <a:srgbClr val="000000"/>
+                </a:solidFill>
+                <a:latin typeface="Arial" panose="020B0604020202020204" pitchFamily="34" charset="0"/>
+                <a:cs typeface="Arial" panose="020B0604020202020204" pitchFamily="34" charset="0"/>
+              </a:endParaRPr>
+            </a:p>
+            <a:p>
+              <a:pPr defTabSz="1218987">
+                <a:spcBef>
+                  <a:spcPts val="267"/>
+                </a:spcBef>
+              </a:pPr>
+              <a:r>
+                <a:rPr lang="en-US" sz="1200" dirty="0">
+                  <a:solidFill>
+                    <a:srgbClr val="000000"/>
+                  </a:solidFill>
+                  <a:latin typeface="Arial" panose="020B0604020202020204" pitchFamily="34" charset="0"/>
+                  <a:cs typeface="Arial" panose="020B0604020202020204" pitchFamily="34" charset="0"/>
+                </a:rPr>
+                <a:t>Experience in working with distributed computing environment such as Hadoop and working on deep learning computer vision problems</a:t>
+              </a:r>
+            </a:p>
+            <a:p>
+              <a:pPr>
+                <a:spcBef>
+                  <a:spcPts val="267"/>
+                </a:spcBef>
+              </a:pPr>
+              <a:endParaRPr lang="en-US" sz="1400" dirty="0">
+                <a:solidFill>
+                  <a:srgbClr val="000000"/>
+                </a:solidFill>
+              </a:endParaRPr>
+            </a:p>
+          </p:txBody>
+        </p:sp>
+        <p:sp>
+          <p:nvSpPr>
+            <p:cNvPr id="29" name="Text Box 4">
+              <a:extLst>
+                <a:ext uri="{FF2B5EF4-FFF2-40B4-BE49-F238E27FC236}">
+                  <a16:creationId xmlns:a16="http://schemas.microsoft.com/office/drawing/2014/main" id="{B05B0D13-146C-4574-8A24-57AFFF8EFA22}"/>
+                </a:ext>
+              </a:extLst>
+            </p:cNvPr>
+            <p:cNvSpPr txBox="1">
+              <a:spLocks noChangeArrowheads="1"/>
+            </p:cNvSpPr>
+            <p:nvPr/>
+          </p:nvSpPr>
+          <p:spPr bwMode="auto">
+            <a:xfrm>
+              <a:off x="6440697" y="1771127"/>
+              <a:ext cx="2049148" cy="818326"/>
+            </a:xfrm>
+            <a:prstGeom prst="rect">
+              <a:avLst/>
+            </a:prstGeom>
+            <a:noFill/>
+            <a:ln>
+              <a:noFill/>
+            </a:ln>
+            <a:extLst>
+              <a:ext uri="{909E8E84-426E-40dd-AFC4-6F175D3DCCD1}">
+                <a14:hiddenFill xmlns="" xmlns:a14="http://schemas.microsoft.com/office/drawing/2010/main">
+                  <a:solidFill>
+                    <a:srgbClr val="FFFFFF"/>
+                  </a:solidFill>
+                </a14:hiddenFill>
+              </a:ext>
+              <a:ext uri="{91240B29-F687-4f45-9708-019B960494DF}">
+                <a14:hiddenLine xmlns="" xmlns:a14="http://schemas.microsoft.com/office/drawing/2010/main" w="9525">
+                  <a:solidFill>
+                    <a:srgbClr val="000000"/>
+                  </a:solidFill>
+                  <a:miter lim="800000"/>
+                  <a:headEnd type="none" w="med" len="med"/>
+                  <a:tailEnd type="none" w="med" len="med"/>
+                </a14:hiddenLine>
+              </a:ext>
+            </a:extLst>
+          </p:spPr>
+          <p:txBody>
+            <a:bodyPr rot="0" vert="horz" wrap="square" lIns="853197" tIns="121885" rIns="0" bIns="0" anchor="t" anchorCtr="0" upright="1">
+              <a:noAutofit/>
+            </a:bodyPr>
+            <a:lstStyle/>
+            <a:p>
+              <a:r>
+                <a:rPr lang="en-US" sz="1600" dirty="0">
+                  <a:solidFill>
+                    <a:prstClr val="black"/>
+                  </a:solidFill>
+                  <a:latin typeface="Cambria"/>
+                  <a:ea typeface="Cambria"/>
+                  <a:cs typeface="Times New Roman"/>
+                </a:rPr>
+                <a:t> </a:t>
+              </a:r>
+              <a:r>
+                <a:rPr lang="en-US" sz="1600" b="1" dirty="0">
+                  <a:solidFill>
+                    <a:srgbClr val="0091D0"/>
+                  </a:solidFill>
+                  <a:latin typeface="Calibri"/>
+                  <a:cs typeface="Times New Roman"/>
+                </a:rPr>
+                <a:t>Adarsh Agrawal</a:t>
+              </a:r>
+            </a:p>
+          </p:txBody>
+        </p:sp>
+        <p:pic>
+          <p:nvPicPr>
+            <p:cNvPr id="30" name="Picture 29">
+              <a:extLst>
+                <a:ext uri="{FF2B5EF4-FFF2-40B4-BE49-F238E27FC236}">
+                  <a16:creationId xmlns:a16="http://schemas.microsoft.com/office/drawing/2014/main" id="{9D831DBE-B372-466D-9B9A-3E4C958531F0}"/>
+                </a:ext>
+              </a:extLst>
+            </p:cNvPr>
+            <p:cNvPicPr>
+              <a:picLocks/>
+            </p:cNvPicPr>
+            <p:nvPr/>
+          </p:nvPicPr>
+          <p:blipFill>
+            <a:blip r:embed="rId5">
+              <a:extLst>
+                <a:ext uri="{28A0092B-C50C-407E-A947-70E740481C1C}">
+                  <a14:useLocalDpi xmlns:a14="http://schemas.microsoft.com/office/drawing/2010/main" val="0"/>
+                </a:ext>
+              </a:extLst>
+            </a:blip>
+            <a:srcRect/>
+            <a:stretch/>
+          </p:blipFill>
+          <p:spPr>
+            <a:xfrm>
+              <a:off x="6503867" y="1830130"/>
+              <a:ext cx="731520" cy="731520"/>
+            </a:xfrm>
+            <a:prstGeom prst="ellipse">
+              <a:avLst/>
+            </a:prstGeom>
+            <a:ln w="28575" cap="rnd">
+              <a:solidFill>
+                <a:schemeClr val="tx2">
+                  <a:lumMod val="60000"/>
+                  <a:lumOff val="40000"/>
+                </a:schemeClr>
+              </a:solidFill>
+            </a:ln>
+            <a:effectLst/>
+          </p:spPr>
+        </p:pic>
+      </p:grpSp>
+      <p:sp>
+        <p:nvSpPr>
+          <p:cNvPr id="31" name="TextBox 30">
+            <a:extLst>
+              <a:ext uri="{FF2B5EF4-FFF2-40B4-BE49-F238E27FC236}">
+                <a16:creationId xmlns:a16="http://schemas.microsoft.com/office/drawing/2014/main" id="{703B009C-D8A2-4ACB-AFC2-53088760D632}"/>
+              </a:ext>
+            </a:extLst>
+          </p:cNvPr>
+          <p:cNvSpPr txBox="1"/>
+          <p:nvPr/>
+        </p:nvSpPr>
+        <p:spPr>
+          <a:xfrm>
+            <a:off x="8896100" y="4735327"/>
+            <a:ext cx="2049148" cy="461665"/>
+          </a:xfrm>
+          <a:prstGeom prst="rect">
+            <a:avLst/>
+          </a:prstGeom>
+          <a:noFill/>
+        </p:spPr>
+        <p:txBody>
+          <a:bodyPr wrap="square" rtlCol="0">
+            <a:spAutoFit/>
+          </a:bodyPr>
+          <a:lstStyle/>
+          <a:p>
+            <a:r>
+              <a:rPr lang="en-US" sz="1200" dirty="0">
+                <a:solidFill>
+                  <a:srgbClr val="000000"/>
+                </a:solidFill>
+              </a:rPr>
+              <a:t>B. Tech. Civil Engineering</a:t>
+            </a:r>
+            <a:endParaRPr lang="en-US" sz="1200" dirty="0">
+              <a:solidFill>
+                <a:prstClr val="black"/>
+              </a:solidFill>
+            </a:endParaRPr>
+          </a:p>
+          <a:p>
+            <a:endParaRPr lang="en-US" sz="1200" dirty="0"/>
+          </a:p>
+        </p:txBody>
+      </p:sp>
     </p:spTree>
     <p:extLst>
       <p:ext uri="{BB962C8B-B14F-4D97-AF65-F5344CB8AC3E}">

</xml_diff>